<commit_message>
Add slide on data abstractions
</commit_message>
<xml_diff>
--- a/09-abs-spec/lec.pptx
+++ b/09-abs-spec/lec.pptx
@@ -5,7 +5,7 @@
     <p:sldMasterId id="2147483648" r:id="rId1"/>
   </p:sldMasterIdLst>
   <p:notesMasterIdLst>
-    <p:notesMasterId r:id="rId34"/>
+    <p:notesMasterId r:id="rId35"/>
   </p:notesMasterIdLst>
   <p:sldIdLst>
     <p:sldId id="441" r:id="rId2"/>
@@ -22,24 +22,25 @@
     <p:sldId id="636" r:id="rId13"/>
     <p:sldId id="637" r:id="rId14"/>
     <p:sldId id="644" r:id="rId15"/>
-    <p:sldId id="505" r:id="rId16"/>
-    <p:sldId id="669" r:id="rId17"/>
-    <p:sldId id="512" r:id="rId18"/>
-    <p:sldId id="525" r:id="rId19"/>
-    <p:sldId id="526" r:id="rId20"/>
-    <p:sldId id="531" r:id="rId21"/>
-    <p:sldId id="495" r:id="rId22"/>
-    <p:sldId id="496" r:id="rId23"/>
-    <p:sldId id="528" r:id="rId24"/>
-    <p:sldId id="527" r:id="rId25"/>
-    <p:sldId id="529" r:id="rId26"/>
-    <p:sldId id="530" r:id="rId27"/>
-    <p:sldId id="532" r:id="rId28"/>
-    <p:sldId id="535" r:id="rId29"/>
-    <p:sldId id="534" r:id="rId30"/>
-    <p:sldId id="491" r:id="rId31"/>
-    <p:sldId id="448" r:id="rId32"/>
-    <p:sldId id="336" r:id="rId33"/>
+    <p:sldId id="671" r:id="rId16"/>
+    <p:sldId id="505" r:id="rId17"/>
+    <p:sldId id="669" r:id="rId18"/>
+    <p:sldId id="512" r:id="rId19"/>
+    <p:sldId id="525" r:id="rId20"/>
+    <p:sldId id="526" r:id="rId21"/>
+    <p:sldId id="531" r:id="rId22"/>
+    <p:sldId id="495" r:id="rId23"/>
+    <p:sldId id="496" r:id="rId24"/>
+    <p:sldId id="528" r:id="rId25"/>
+    <p:sldId id="527" r:id="rId26"/>
+    <p:sldId id="529" r:id="rId27"/>
+    <p:sldId id="530" r:id="rId28"/>
+    <p:sldId id="532" r:id="rId29"/>
+    <p:sldId id="535" r:id="rId30"/>
+    <p:sldId id="534" r:id="rId31"/>
+    <p:sldId id="491" r:id="rId32"/>
+    <p:sldId id="448" r:id="rId33"/>
+    <p:sldId id="336" r:id="rId34"/>
   </p:sldIdLst>
   <p:sldSz cx="9144000" cy="6858000" type="screen4x3"/>
   <p:notesSz cx="6858000" cy="9144000"/>
@@ -239,7 +240,7 @@
           <a:p>
             <a:fld id="{5367F125-181F-9A48-A24E-AAD89CB055B5}" type="datetimeFigureOut">
               <a:rPr lang="en-US" smtClean="0"/>
-              <a:t>9/24/19</a:t>
+              <a:t>9/25/19</a:t>
             </a:fld>
             <a:endParaRPr lang="en-US"/>
           </a:p>
@@ -639,92 +640,15 @@
           <a:p>
             <a:r>
               <a:rPr lang="en-US" dirty="0"/>
-              <a:t>Using this example because you all had to think about set-like lists as part of A2</a:t>
-            </a:r>
-          </a:p>
-          <a:p>
-            <a:endParaRPr lang="en-US" dirty="0"/>
-          </a:p>
-          <a:p>
+              <a:t>If designed well, a data abstraction generally corresponds to a signature in </a:t>
+            </a:r>
+            <a:r>
+              <a:rPr lang="en-US" dirty="0" err="1"/>
+              <a:t>OCaml</a:t>
+            </a:r>
             <a:r>
               <a:rPr lang="en-US" dirty="0"/>
-              <a:t>Demo:</a:t>
-            </a:r>
-          </a:p>
-          <a:p>
-            <a:pPr marL="171450" indent="-171450">
-              <a:buFont typeface="Arial" panose="020B0604020202020204" pitchFamily="34" charset="0"/>
-              <a:buChar char="•"/>
-            </a:pPr>
-            <a:r>
-              <a:rPr lang="en-US" dirty="0"/>
-              <a:t>set interface</a:t>
-            </a:r>
-          </a:p>
-          <a:p>
-            <a:pPr marL="171450" indent="-171450">
-              <a:buFont typeface="Arial" panose="020B0604020202020204" pitchFamily="34" charset="0"/>
-              <a:buChar char="•"/>
-            </a:pPr>
-            <a:r>
-              <a:rPr lang="en-US" dirty="0"/>
-              <a:t>two </a:t>
-            </a:r>
-            <a:r>
-              <a:rPr lang="en-US" dirty="0" err="1"/>
-              <a:t>impls</a:t>
-            </a:r>
-            <a:r>
-              <a:rPr lang="en-US" dirty="0"/>
-              <a:t>:  with or without duplicates:  write that down as comment above type [t], and how to interpret the list as a set</a:t>
-            </a:r>
-          </a:p>
-          <a:p>
-            <a:pPr marL="628650" lvl="1" indent="-171450">
-              <a:buFont typeface="Arial" panose="020B0604020202020204" pitchFamily="34" charset="0"/>
-              <a:buChar char="•"/>
-            </a:pPr>
-            <a:r>
-              <a:rPr lang="en-US" dirty="0"/>
-              <a:t>empty=[], mem = </a:t>
-            </a:r>
-            <a:r>
-              <a:rPr lang="en-US" dirty="0" err="1"/>
-              <a:t>List.mem</a:t>
-            </a:r>
-            <a:endParaRPr lang="en-US" dirty="0"/>
-          </a:p>
-          <a:p>
-            <a:pPr marL="628650" lvl="1" indent="-171450">
-              <a:buFont typeface="Arial" panose="020B0604020202020204" pitchFamily="34" charset="0"/>
-              <a:buChar char="•"/>
-            </a:pPr>
-            <a:r>
-              <a:rPr lang="en-US" dirty="0"/>
-              <a:t>without dups:  add requires using [mem] to </a:t>
-            </a:r>
-            <a:r>
-              <a:rPr lang="en-US" dirty="0" err="1"/>
-              <a:t>dedup</a:t>
-            </a:r>
-            <a:r>
-              <a:rPr lang="en-US" dirty="0"/>
-              <a:t>, size is just </a:t>
-            </a:r>
-            <a:r>
-              <a:rPr lang="en-US" dirty="0" err="1"/>
-              <a:t>List.length</a:t>
-            </a:r>
-            <a:endParaRPr lang="en-US" dirty="0"/>
-          </a:p>
-          <a:p>
-            <a:pPr marL="628650" lvl="1" indent="-171450">
-              <a:buFont typeface="Arial" panose="020B0604020202020204" pitchFamily="34" charset="0"/>
-              <a:buChar char="•"/>
-            </a:pPr>
-            <a:r>
-              <a:rPr lang="en-US" dirty="0"/>
-              <a:t>with dups:  add is just [::], size requires more work</a:t>
+              <a:t>; and a data structure, to a structure.  But I supposes you could expose too many implementation details in a signature (and its specification comments) and then it would no longer be an abstraction.</a:t>
             </a:r>
           </a:p>
         </p:txBody>
@@ -755,7 +679,7 @@
     </p:spTree>
     <p:extLst>
       <p:ext uri="{BB962C8B-B14F-4D97-AF65-F5344CB8AC3E}">
-        <p14:creationId xmlns:p14="http://schemas.microsoft.com/office/powerpoint/2010/main" val="3930223372"/>
+        <p14:creationId xmlns:p14="http://schemas.microsoft.com/office/powerpoint/2010/main" val="4255347637"/>
       </p:ext>
     </p:extLst>
   </p:cSld>
@@ -810,47 +734,93 @@
           <a:lstStyle/>
           <a:p>
             <a:r>
-              <a:rPr lang="en-US" sz="1200" dirty="0"/>
-              <a:t>Not actually an </a:t>
-            </a:r>
-            <a:r>
-              <a:rPr lang="en-US" sz="1200" dirty="0" err="1"/>
-              <a:t>OCaml</a:t>
-            </a:r>
-            <a:r>
-              <a:rPr lang="en-US" sz="1200" dirty="0"/>
-              <a:t> function, but a mathematical function</a:t>
-            </a:r>
-          </a:p>
-          <a:p>
-            <a:r>
-              <a:rPr lang="en-US" sz="1200" dirty="0"/>
-              <a:t>Maps </a:t>
-            </a:r>
-            <a:r>
-              <a:rPr lang="en-US" sz="1200" i="1" dirty="0"/>
-              <a:t>concrete values</a:t>
-            </a:r>
-            <a:r>
-              <a:rPr lang="en-US" sz="1200" dirty="0"/>
-              <a:t> to </a:t>
-            </a:r>
-            <a:r>
-              <a:rPr lang="en-US" sz="1200" i="1" dirty="0"/>
-              <a:t>abstract values</a:t>
-            </a:r>
-            <a:endParaRPr lang="en-US" sz="1200" dirty="0"/>
-          </a:p>
-          <a:p>
-            <a:r>
               <a:rPr lang="en-US" dirty="0"/>
-              <a:t>Many to one:  many concrete values map to same abstract value</a:t>
-            </a:r>
+              <a:t>Using this example because you all had to think about set-like lists as part of A2</a:t>
+            </a:r>
+          </a:p>
+          <a:p>
+            <a:endParaRPr lang="en-US" dirty="0"/>
           </a:p>
           <a:p>
             <a:r>
               <a:rPr lang="en-US" dirty="0"/>
-              <a:t>Partial:  some concrete values do not map to any abstract value</a:t>
+              <a:t>Demo:</a:t>
+            </a:r>
+          </a:p>
+          <a:p>
+            <a:pPr marL="171450" indent="-171450">
+              <a:buFont typeface="Arial" panose="020B0604020202020204" pitchFamily="34" charset="0"/>
+              <a:buChar char="•"/>
+            </a:pPr>
+            <a:r>
+              <a:rPr lang="en-US" dirty="0"/>
+              <a:t>set interface</a:t>
+            </a:r>
+          </a:p>
+          <a:p>
+            <a:pPr marL="171450" indent="-171450">
+              <a:buFont typeface="Arial" panose="020B0604020202020204" pitchFamily="34" charset="0"/>
+              <a:buChar char="•"/>
+            </a:pPr>
+            <a:r>
+              <a:rPr lang="en-US" dirty="0"/>
+              <a:t>two </a:t>
+            </a:r>
+            <a:r>
+              <a:rPr lang="en-US" dirty="0" err="1"/>
+              <a:t>impls</a:t>
+            </a:r>
+            <a:r>
+              <a:rPr lang="en-US" dirty="0"/>
+              <a:t>:  with or without duplicates:  write that down as comment above type [t], and how to interpret the list as a set</a:t>
+            </a:r>
+          </a:p>
+          <a:p>
+            <a:pPr marL="628650" lvl="1" indent="-171450">
+              <a:buFont typeface="Arial" panose="020B0604020202020204" pitchFamily="34" charset="0"/>
+              <a:buChar char="•"/>
+            </a:pPr>
+            <a:r>
+              <a:rPr lang="en-US" dirty="0"/>
+              <a:t>empty=[], mem = </a:t>
+            </a:r>
+            <a:r>
+              <a:rPr lang="en-US" dirty="0" err="1"/>
+              <a:t>List.mem</a:t>
+            </a:r>
+            <a:endParaRPr lang="en-US" dirty="0"/>
+          </a:p>
+          <a:p>
+            <a:pPr marL="628650" lvl="1" indent="-171450">
+              <a:buFont typeface="Arial" panose="020B0604020202020204" pitchFamily="34" charset="0"/>
+              <a:buChar char="•"/>
+            </a:pPr>
+            <a:r>
+              <a:rPr lang="en-US" dirty="0"/>
+              <a:t>without dups:  add requires using [mem] to </a:t>
+            </a:r>
+            <a:r>
+              <a:rPr lang="en-US" dirty="0" err="1"/>
+              <a:t>dedup</a:t>
+            </a:r>
+            <a:r>
+              <a:rPr lang="en-US" dirty="0"/>
+              <a:t>, size is just </a:t>
+            </a:r>
+            <a:r>
+              <a:rPr lang="en-US" dirty="0" err="1"/>
+              <a:t>List.length</a:t>
+            </a:r>
+            <a:endParaRPr lang="en-US" dirty="0"/>
+          </a:p>
+          <a:p>
+            <a:pPr marL="628650" lvl="1" indent="-171450">
+              <a:buFont typeface="Arial" panose="020B0604020202020204" pitchFamily="34" charset="0"/>
+              <a:buChar char="•"/>
+            </a:pPr>
+            <a:r>
+              <a:rPr lang="en-US" dirty="0"/>
+              <a:t>with dups:  add is just [::], size requires more work</a:t>
             </a:r>
           </a:p>
         </p:txBody>
@@ -872,7 +842,7 @@
           <a:p>
             <a:fld id="{B7975FD5-AB21-4C45-BFE8-1D3F02B463E2}" type="slidenum">
               <a:rPr lang="en-US" smtClean="0"/>
-              <a:t>19</a:t>
+              <a:t>16</a:t>
             </a:fld>
             <a:endParaRPr lang="en-US"/>
           </a:p>
@@ -881,7 +851,7 @@
     </p:spTree>
     <p:extLst>
       <p:ext uri="{BB962C8B-B14F-4D97-AF65-F5344CB8AC3E}">
-        <p14:creationId xmlns:p14="http://schemas.microsoft.com/office/powerpoint/2010/main" val="3728864829"/>
+        <p14:creationId xmlns:p14="http://schemas.microsoft.com/office/powerpoint/2010/main" val="3930223372"/>
       </p:ext>
     </p:extLst>
   </p:cSld>
@@ -935,79 +905,48 @@
           <a:bodyPr/>
           <a:lstStyle/>
           <a:p>
-            <a:pPr lvl="0"/>
+            <a:r>
+              <a:rPr lang="en-US" sz="1200" dirty="0"/>
+              <a:t>Not actually an </a:t>
+            </a:r>
+            <a:r>
+              <a:rPr lang="en-US" sz="1200" dirty="0" err="1"/>
+              <a:t>OCaml</a:t>
+            </a:r>
+            <a:r>
+              <a:rPr lang="en-US" sz="1200" dirty="0"/>
+              <a:t> function, but a mathematical function</a:t>
+            </a:r>
+          </a:p>
+          <a:p>
+            <a:r>
+              <a:rPr lang="en-US" sz="1200" dirty="0"/>
+              <a:t>Maps </a:t>
+            </a:r>
+            <a:r>
+              <a:rPr lang="en-US" sz="1200" i="1" dirty="0"/>
+              <a:t>concrete values</a:t>
+            </a:r>
+            <a:r>
+              <a:rPr lang="en-US" sz="1200" dirty="0"/>
+              <a:t> to </a:t>
+            </a:r>
+            <a:r>
+              <a:rPr lang="en-US" sz="1200" i="1" dirty="0"/>
+              <a:t>abstract values</a:t>
+            </a:r>
+            <a:endParaRPr lang="en-US" sz="1200" dirty="0"/>
+          </a:p>
+          <a:p>
             <a:r>
               <a:rPr lang="en-US" dirty="0"/>
-              <a:t>You can spell out AF.</a:t>
-            </a:r>
-          </a:p>
-          <a:p>
-            <a:pPr lvl="0"/>
+              <a:t>Many to one:  many concrete values map to same abstract value</a:t>
+            </a:r>
+          </a:p>
+          <a:p>
             <a:r>
               <a:rPr lang="en-US" dirty="0"/>
-              <a:t>Why </a:t>
-            </a:r>
-            <a:r>
-              <a:rPr lang="en-US" b="1" dirty="0"/>
-              <a:t>first</a:t>
-            </a:r>
-            <a:r>
-              <a:rPr lang="en-US" dirty="0"/>
-              <a:t>?</a:t>
-            </a:r>
-          </a:p>
-          <a:p>
-            <a:pPr marL="171450" lvl="0" indent="-171450">
-              <a:buFont typeface="Arial" panose="020B0604020202020204" pitchFamily="34" charset="0"/>
-              <a:buChar char="•"/>
-            </a:pPr>
-            <a:r>
-              <a:rPr lang="en-US" dirty="0"/>
-              <a:t>It’s the number one decision you have to make while implementing a data abstraction</a:t>
-            </a:r>
-          </a:p>
-          <a:p>
-            <a:pPr marL="171450" lvl="0" indent="-171450">
-              <a:buFont typeface="Arial" panose="020B0604020202020204" pitchFamily="34" charset="0"/>
-              <a:buChar char="•"/>
-            </a:pPr>
-            <a:r>
-              <a:rPr lang="en-US" dirty="0"/>
-              <a:t>It gives meaning to representation</a:t>
-            </a:r>
-          </a:p>
-          <a:p>
-            <a:pPr marL="171450" lvl="0" indent="-171450">
-              <a:buFont typeface="Arial" panose="020B0604020202020204" pitchFamily="34" charset="0"/>
-              <a:buChar char="•"/>
-            </a:pPr>
-            <a:r>
-              <a:rPr lang="en-US" dirty="0"/>
-              <a:t>It dictates what values are necessary in a module, or what fields are necessary in an object</a:t>
-            </a:r>
-          </a:p>
-          <a:p>
-            <a:pPr marL="171450" lvl="0" indent="-171450">
-              <a:buFont typeface="Arial" panose="020B0604020202020204" pitchFamily="34" charset="0"/>
-              <a:buChar char="•"/>
-            </a:pPr>
-            <a:endParaRPr lang="en-US" dirty="0"/>
-          </a:p>
-          <a:p>
-            <a:pPr marL="171450" lvl="0" indent="-171450">
-              <a:buFont typeface="Arial" panose="020B0604020202020204" pitchFamily="34" charset="0"/>
-              <a:buChar char="•"/>
-            </a:pPr>
-            <a:endParaRPr lang="en-US" dirty="0"/>
-          </a:p>
-          <a:p>
-            <a:pPr marL="0" lvl="0" indent="0">
-              <a:buFont typeface="Arial" panose="020B0604020202020204" pitchFamily="34" charset="0"/>
-              <a:buNone/>
-            </a:pPr>
-            <a:r>
-              <a:rPr lang="en-US" dirty="0"/>
-              <a:t>Demo: we already did this!  It’s part of what we wrote as the comment for [t].</a:t>
+              <a:t>Partial:  some concrete values do not map to any abstract value</a:t>
             </a:r>
           </a:p>
         </p:txBody>
@@ -1029,7 +968,7 @@
           <a:p>
             <a:fld id="{B7975FD5-AB21-4C45-BFE8-1D3F02B463E2}" type="slidenum">
               <a:rPr lang="en-US" smtClean="0"/>
-              <a:t>21</a:t>
+              <a:t>20</a:t>
             </a:fld>
             <a:endParaRPr lang="en-US"/>
           </a:p>
@@ -1038,7 +977,7 @@
     </p:spTree>
     <p:extLst>
       <p:ext uri="{BB962C8B-B14F-4D97-AF65-F5344CB8AC3E}">
-        <p14:creationId xmlns:p14="http://schemas.microsoft.com/office/powerpoint/2010/main" val="1495865341"/>
+        <p14:creationId xmlns:p14="http://schemas.microsoft.com/office/powerpoint/2010/main" val="3728864829"/>
       </p:ext>
     </p:extLst>
   </p:cSld>
@@ -1092,7 +1031,80 @@
           <a:bodyPr/>
           <a:lstStyle/>
           <a:p>
+            <a:pPr lvl="0"/>
+            <a:r>
+              <a:rPr lang="en-US" dirty="0"/>
+              <a:t>You can spell out AF.</a:t>
+            </a:r>
+          </a:p>
+          <a:p>
+            <a:pPr lvl="0"/>
+            <a:r>
+              <a:rPr lang="en-US" dirty="0"/>
+              <a:t>Why </a:t>
+            </a:r>
+            <a:r>
+              <a:rPr lang="en-US" b="1" dirty="0"/>
+              <a:t>first</a:t>
+            </a:r>
+            <a:r>
+              <a:rPr lang="en-US" dirty="0"/>
+              <a:t>?</a:t>
+            </a:r>
+          </a:p>
+          <a:p>
+            <a:pPr marL="171450" lvl="0" indent="-171450">
+              <a:buFont typeface="Arial" panose="020B0604020202020204" pitchFamily="34" charset="0"/>
+              <a:buChar char="•"/>
+            </a:pPr>
+            <a:r>
+              <a:rPr lang="en-US" dirty="0"/>
+              <a:t>It’s the number one decision you have to make while implementing a data abstraction</a:t>
+            </a:r>
+          </a:p>
+          <a:p>
+            <a:pPr marL="171450" lvl="0" indent="-171450">
+              <a:buFont typeface="Arial" panose="020B0604020202020204" pitchFamily="34" charset="0"/>
+              <a:buChar char="•"/>
+            </a:pPr>
+            <a:r>
+              <a:rPr lang="en-US" dirty="0"/>
+              <a:t>It gives meaning to representation</a:t>
+            </a:r>
+          </a:p>
+          <a:p>
+            <a:pPr marL="171450" lvl="0" indent="-171450">
+              <a:buFont typeface="Arial" panose="020B0604020202020204" pitchFamily="34" charset="0"/>
+              <a:buChar char="•"/>
+            </a:pPr>
+            <a:r>
+              <a:rPr lang="en-US" dirty="0"/>
+              <a:t>It dictates what values are necessary in a module, or what fields are necessary in an object</a:t>
+            </a:r>
+          </a:p>
+          <a:p>
+            <a:pPr marL="171450" lvl="0" indent="-171450">
+              <a:buFont typeface="Arial" panose="020B0604020202020204" pitchFamily="34" charset="0"/>
+              <a:buChar char="•"/>
+            </a:pPr>
             <a:endParaRPr lang="en-US" dirty="0"/>
+          </a:p>
+          <a:p>
+            <a:pPr marL="171450" lvl="0" indent="-171450">
+              <a:buFont typeface="Arial" panose="020B0604020202020204" pitchFamily="34" charset="0"/>
+              <a:buChar char="•"/>
+            </a:pPr>
+            <a:endParaRPr lang="en-US" dirty="0"/>
+          </a:p>
+          <a:p>
+            <a:pPr marL="0" lvl="0" indent="0">
+              <a:buFont typeface="Arial" panose="020B0604020202020204" pitchFamily="34" charset="0"/>
+              <a:buNone/>
+            </a:pPr>
+            <a:r>
+              <a:rPr lang="en-US" dirty="0"/>
+              <a:t>Demo: we already did this!  It’s part of what we wrote as the comment for [t].</a:t>
+            </a:r>
           </a:p>
         </p:txBody>
       </p:sp>
@@ -1122,7 +1134,7 @@
     </p:spTree>
     <p:extLst>
       <p:ext uri="{BB962C8B-B14F-4D97-AF65-F5344CB8AC3E}">
-        <p14:creationId xmlns:p14="http://schemas.microsoft.com/office/powerpoint/2010/main" val="3495222775"/>
+        <p14:creationId xmlns:p14="http://schemas.microsoft.com/office/powerpoint/2010/main" val="1495865341"/>
       </p:ext>
     </p:extLst>
   </p:cSld>
@@ -1197,7 +1209,7 @@
           <a:p>
             <a:fld id="{B7975FD5-AB21-4C45-BFE8-1D3F02B463E2}" type="slidenum">
               <a:rPr lang="en-US" smtClean="0"/>
-              <a:t>25</a:t>
+              <a:t>23</a:t>
             </a:fld>
             <a:endParaRPr lang="en-US"/>
           </a:p>
@@ -1206,7 +1218,7 @@
     </p:spTree>
     <p:extLst>
       <p:ext uri="{BB962C8B-B14F-4D97-AF65-F5344CB8AC3E}">
-        <p14:creationId xmlns:p14="http://schemas.microsoft.com/office/powerpoint/2010/main" val="2083241562"/>
+        <p14:creationId xmlns:p14="http://schemas.microsoft.com/office/powerpoint/2010/main" val="3495222775"/>
       </p:ext>
     </p:extLst>
   </p:cSld>
@@ -1260,54 +1272,6 @@
           <a:bodyPr/>
           <a:lstStyle/>
           <a:p>
-            <a:pPr marL="171450" lvl="0" indent="-171450">
-              <a:buFont typeface="Arial" panose="020B0604020202020204" pitchFamily="34" charset="0"/>
-              <a:buChar char="•"/>
-            </a:pPr>
-            <a:r>
-              <a:rPr lang="en-US" dirty="0"/>
-              <a:t>“Rep invariant” or "RI" for short</a:t>
-            </a:r>
-          </a:p>
-          <a:p>
-            <a:pPr marL="171450" lvl="0" indent="-171450">
-              <a:buFont typeface="Arial" panose="020B0604020202020204" pitchFamily="34" charset="0"/>
-              <a:buChar char="•"/>
-            </a:pPr>
-            <a:r>
-              <a:rPr lang="en-US" dirty="0"/>
-              <a:t>Valid concrete values mapped by AF to abstract values</a:t>
-            </a:r>
-          </a:p>
-          <a:p>
-            <a:pPr marL="171450" lvl="0" indent="-171450">
-              <a:buFont typeface="Arial" panose="020B0604020202020204" pitchFamily="34" charset="0"/>
-              <a:buChar char="•"/>
-            </a:pPr>
-            <a:r>
-              <a:rPr lang="en-US" dirty="0"/>
-              <a:t>Invalid concrete value not mapped by AF to any abstract values</a:t>
-            </a:r>
-          </a:p>
-          <a:p>
-            <a:pPr marL="171450" lvl="0" indent="-171450">
-              <a:buFont typeface="Arial" panose="020B0604020202020204" pitchFamily="34" charset="0"/>
-              <a:buChar char="•"/>
-            </a:pPr>
-            <a:r>
-              <a:rPr lang="en-US" dirty="0"/>
-              <a:t>Closely related to </a:t>
-            </a:r>
-            <a:r>
-              <a:rPr lang="en-US" i="1" dirty="0"/>
-              <a:t>class invariants</a:t>
-            </a:r>
-            <a:r>
-              <a:rPr lang="en-US" dirty="0"/>
-              <a:t> that you saw in 2110</a:t>
-            </a:r>
-          </a:p>
-          <a:p>
             <a:endParaRPr lang="en-US" dirty="0"/>
           </a:p>
         </p:txBody>
@@ -1338,7 +1302,7 @@
     </p:spTree>
     <p:extLst>
       <p:ext uri="{BB962C8B-B14F-4D97-AF65-F5344CB8AC3E}">
-        <p14:creationId xmlns:p14="http://schemas.microsoft.com/office/powerpoint/2010/main" val="641592375"/>
+        <p14:creationId xmlns:p14="http://schemas.microsoft.com/office/powerpoint/2010/main" val="2083241562"/>
       </p:ext>
     </p:extLst>
   </p:cSld>
@@ -1392,17 +1356,54 @@
           <a:bodyPr/>
           <a:lstStyle/>
           <a:p>
-            <a:pPr marL="0" lvl="0" indent="0">
+            <a:pPr marL="171450" lvl="0" indent="-171450">
               <a:buFont typeface="Arial" panose="020B0604020202020204" pitchFamily="34" charset="0"/>
-              <a:buNone/>
+              <a:buChar char="•"/>
             </a:pPr>
             <a:r>
               <a:rPr lang="en-US" dirty="0"/>
-              <a:t>Demo: we already did this!  It’s part of what we wrote as the comment for [t].</a:t>
-            </a:r>
-          </a:p>
-          <a:p>
-            <a:pPr lvl="0"/>
+              <a:t>“Rep invariant” or "RI" for short</a:t>
+            </a:r>
+          </a:p>
+          <a:p>
+            <a:pPr marL="171450" lvl="0" indent="-171450">
+              <a:buFont typeface="Arial" panose="020B0604020202020204" pitchFamily="34" charset="0"/>
+              <a:buChar char="•"/>
+            </a:pPr>
+            <a:r>
+              <a:rPr lang="en-US" dirty="0"/>
+              <a:t>Valid concrete values mapped by AF to abstract values</a:t>
+            </a:r>
+          </a:p>
+          <a:p>
+            <a:pPr marL="171450" lvl="0" indent="-171450">
+              <a:buFont typeface="Arial" panose="020B0604020202020204" pitchFamily="34" charset="0"/>
+              <a:buChar char="•"/>
+            </a:pPr>
+            <a:r>
+              <a:rPr lang="en-US" dirty="0"/>
+              <a:t>Invalid concrete value not mapped by AF to any abstract values</a:t>
+            </a:r>
+          </a:p>
+          <a:p>
+            <a:pPr marL="171450" lvl="0" indent="-171450">
+              <a:buFont typeface="Arial" panose="020B0604020202020204" pitchFamily="34" charset="0"/>
+              <a:buChar char="•"/>
+            </a:pPr>
+            <a:r>
+              <a:rPr lang="en-US" dirty="0"/>
+              <a:t>Closely related to </a:t>
+            </a:r>
+            <a:r>
+              <a:rPr lang="en-US" i="1" dirty="0"/>
+              <a:t>class invariants</a:t>
+            </a:r>
+            <a:r>
+              <a:rPr lang="en-US" dirty="0"/>
+              <a:t> that you saw in 2110</a:t>
+            </a:r>
+          </a:p>
+          <a:p>
             <a:endParaRPr lang="en-US" dirty="0"/>
           </a:p>
         </p:txBody>
@@ -1424,7 +1425,7 @@
           <a:p>
             <a:fld id="{B7975FD5-AB21-4C45-BFE8-1D3F02B463E2}" type="slidenum">
               <a:rPr lang="en-US" smtClean="0"/>
-              <a:t>28</a:t>
+              <a:t>27</a:t>
             </a:fld>
             <a:endParaRPr lang="en-US"/>
           </a:p>
@@ -1433,7 +1434,7 @@
     </p:spTree>
     <p:extLst>
       <p:ext uri="{BB962C8B-B14F-4D97-AF65-F5344CB8AC3E}">
-        <p14:creationId xmlns:p14="http://schemas.microsoft.com/office/powerpoint/2010/main" val="3807489072"/>
+        <p14:creationId xmlns:p14="http://schemas.microsoft.com/office/powerpoint/2010/main" val="641592375"/>
       </p:ext>
     </p:extLst>
   </p:cSld>
@@ -1487,18 +1488,18 @@
           <a:bodyPr/>
           <a:lstStyle/>
           <a:p>
+            <a:pPr marL="0" lvl="0" indent="0">
+              <a:buFont typeface="Arial" panose="020B0604020202020204" pitchFamily="34" charset="0"/>
+              <a:buNone/>
+            </a:pPr>
             <a:r>
               <a:rPr lang="en-US" dirty="0"/>
-              <a:t>Demo:  add comments to [</a:t>
-            </a:r>
-            <a:r>
-              <a:rPr lang="en-US" dirty="0" err="1"/>
-              <a:t>ListSetNoDups</a:t>
-            </a:r>
-            <a:r>
-              <a:rPr lang="en-US" dirty="0"/>
-              <a:t>] operations to say that inputs/output contain no duplicates</a:t>
-            </a:r>
+              <a:t>Demo: we already did this!  It’s part of what we wrote as the comment for [t].</a:t>
+            </a:r>
+          </a:p>
+          <a:p>
+            <a:pPr lvl="0"/>
+            <a:endParaRPr lang="en-US" dirty="0"/>
           </a:p>
         </p:txBody>
       </p:sp>
@@ -1528,7 +1529,7 @@
     </p:spTree>
     <p:extLst>
       <p:ext uri="{BB962C8B-B14F-4D97-AF65-F5344CB8AC3E}">
-        <p14:creationId xmlns:p14="http://schemas.microsoft.com/office/powerpoint/2010/main" val="938749078"/>
+        <p14:creationId xmlns:p14="http://schemas.microsoft.com/office/powerpoint/2010/main" val="3807489072"/>
       </p:ext>
     </p:extLst>
   </p:cSld>
@@ -1582,159 +1583,18 @@
           <a:bodyPr/>
           <a:lstStyle/>
           <a:p>
-            <a:pPr marL="0" indent="0">
-              <a:buNone/>
-            </a:pPr>
             <a:r>
               <a:rPr lang="en-US" dirty="0"/>
-              <a:t>RI is </a:t>
-            </a:r>
-            <a:r>
-              <a:rPr lang="en-US" dirty="0">
-                <a:solidFill>
-                  <a:schemeClr val="accent6"/>
-                </a:solidFill>
-              </a:rPr>
-              <a:t>a fact whose truth is </a:t>
-            </a:r>
-            <a:r>
-              <a:rPr lang="en-US" i="1" dirty="0">
-                <a:solidFill>
-                  <a:schemeClr val="accent6"/>
-                </a:solidFill>
-              </a:rPr>
-              <a:t>invariant</a:t>
-            </a:r>
-            <a:r>
-              <a:rPr lang="en-US" dirty="0">
-                <a:solidFill>
-                  <a:schemeClr val="accent6"/>
-                </a:solidFill>
-              </a:rPr>
-              <a:t> </a:t>
+              <a:t>Demo:  add comments to [</a:t>
+            </a:r>
+            <a:r>
+              <a:rPr lang="en-US" dirty="0" err="1"/>
+              <a:t>ListSetNoDups</a:t>
             </a:r>
             <a:r>
               <a:rPr lang="en-US" dirty="0"/>
-              <a:t>except for limited blocks of code</a:t>
-            </a:r>
-          </a:p>
-          <a:p>
-            <a:pPr marL="171450" lvl="0" indent="-171450">
-              <a:buFont typeface="Arial" panose="020B0604020202020204" pitchFamily="34" charset="0"/>
-              <a:buChar char="•"/>
-            </a:pPr>
-            <a:r>
-              <a:rPr lang="en-US" dirty="0"/>
-              <a:t>(much like loop invariants from 2110)</a:t>
-            </a:r>
-          </a:p>
-          <a:p>
-            <a:pPr marL="171450" lvl="0" indent="-171450">
-              <a:buFont typeface="Arial" panose="020B0604020202020204" pitchFamily="34" charset="0"/>
-              <a:buChar char="•"/>
-            </a:pPr>
-            <a:r>
-              <a:rPr lang="en-US" dirty="0"/>
-              <a:t>RI is implicitly part of pre- and post-conditions</a:t>
-            </a:r>
-          </a:p>
-          <a:p>
-            <a:pPr marL="171450" lvl="0" indent="-171450">
-              <a:buFont typeface="Arial" panose="020B0604020202020204" pitchFamily="34" charset="0"/>
-              <a:buChar char="•"/>
-            </a:pPr>
-            <a:r>
-              <a:rPr lang="en-US" dirty="0"/>
-              <a:t>operations may violate it temporarily (e.g., construct a list with duplicates then throw out the duplicates)</a:t>
-            </a:r>
-          </a:p>
-          <a:p>
-            <a:pPr marL="0" lvl="0" indent="0">
-              <a:buFont typeface="Arial" panose="020B0604020202020204" pitchFamily="34" charset="0"/>
-              <a:buNone/>
-            </a:pPr>
-            <a:endParaRPr lang="en-US" dirty="0"/>
-          </a:p>
-          <a:p>
-            <a:pPr marL="0" lvl="0" indent="0">
-              <a:buFont typeface="Arial" panose="020B0604020202020204" pitchFamily="34" charset="0"/>
-              <a:buNone/>
-            </a:pPr>
-            <a:r>
-              <a:rPr lang="en-US" dirty="0"/>
-              <a:t>Demo:  </a:t>
-            </a:r>
-            <a:r>
-              <a:rPr lang="en-US" dirty="0">
-                <a:solidFill>
-                  <a:schemeClr val="accent6"/>
-                </a:solidFill>
-              </a:rPr>
-              <a:t>Consider implementing [union] in both.</a:t>
-            </a:r>
-          </a:p>
-          <a:p>
-            <a:pPr marL="171450" lvl="0" indent="-171450">
-              <a:buFont typeface="Arial" panose="020B0604020202020204" pitchFamily="34" charset="0"/>
-              <a:buChar char="•"/>
-            </a:pPr>
-            <a:r>
-              <a:rPr lang="en-US" dirty="0">
-                <a:solidFill>
-                  <a:schemeClr val="accent6"/>
-                </a:solidFill>
-              </a:rPr>
-              <a:t>[</a:t>
-            </a:r>
-            <a:r>
-              <a:rPr lang="en-US" dirty="0" err="1">
-                <a:solidFill>
-                  <a:schemeClr val="accent6"/>
-                </a:solidFill>
-              </a:rPr>
-              <a:t>ListSetNoDups</a:t>
-            </a:r>
-            <a:r>
-              <a:rPr lang="en-US" dirty="0">
-                <a:solidFill>
-                  <a:schemeClr val="accent6"/>
-                </a:solidFill>
-              </a:rPr>
-              <a:t>] requires deduplication:  temporarily a list constructed with dups, but remove them</a:t>
-            </a:r>
-          </a:p>
-          <a:p>
-            <a:pPr marL="171450" lvl="0" indent="-171450">
-              <a:buFont typeface="Arial" panose="020B0604020202020204" pitchFamily="34" charset="0"/>
-              <a:buChar char="•"/>
-            </a:pPr>
-            <a:r>
-              <a:rPr lang="en-US" dirty="0">
-                <a:solidFill>
-                  <a:schemeClr val="accent6"/>
-                </a:solidFill>
-              </a:rPr>
-              <a:t>[</a:t>
-            </a:r>
-            <a:r>
-              <a:rPr lang="en-US" dirty="0" err="1">
-                <a:solidFill>
-                  <a:schemeClr val="accent6"/>
-                </a:solidFill>
-              </a:rPr>
-              <a:t>ListSetDups</a:t>
-            </a:r>
-            <a:r>
-              <a:rPr lang="en-US" dirty="0">
-                <a:solidFill>
-                  <a:schemeClr val="accent6"/>
-                </a:solidFill>
-              </a:rPr>
-              <a:t>] does not require deduplication</a:t>
-            </a:r>
-          </a:p>
-          <a:p>
-            <a:endParaRPr lang="en-US" dirty="0"/>
+              <a:t>] operations to say that inputs/output contain no duplicates</a:t>
+            </a:r>
           </a:p>
         </p:txBody>
       </p:sp>
@@ -1764,7 +1624,7 @@
     </p:spTree>
     <p:extLst>
       <p:ext uri="{BB962C8B-B14F-4D97-AF65-F5344CB8AC3E}">
-        <p14:creationId xmlns:p14="http://schemas.microsoft.com/office/powerpoint/2010/main" val="3196639281"/>
+        <p14:creationId xmlns:p14="http://schemas.microsoft.com/office/powerpoint/2010/main" val="938749078"/>
       </p:ext>
     </p:extLst>
   </p:cSld>
@@ -1818,10 +1678,159 @@
           <a:bodyPr/>
           <a:lstStyle/>
           <a:p>
+            <a:pPr marL="0" indent="0">
+              <a:buNone/>
+            </a:pPr>
             <a:r>
               <a:rPr lang="en-US" dirty="0"/>
-              <a:t>Example with sets in textbook</a:t>
-            </a:r>
+              <a:t>RI is </a:t>
+            </a:r>
+            <a:r>
+              <a:rPr lang="en-US" dirty="0">
+                <a:solidFill>
+                  <a:schemeClr val="accent6"/>
+                </a:solidFill>
+              </a:rPr>
+              <a:t>a fact whose truth is </a:t>
+            </a:r>
+            <a:r>
+              <a:rPr lang="en-US" i="1" dirty="0">
+                <a:solidFill>
+                  <a:schemeClr val="accent6"/>
+                </a:solidFill>
+              </a:rPr>
+              <a:t>invariant</a:t>
+            </a:r>
+            <a:r>
+              <a:rPr lang="en-US" dirty="0">
+                <a:solidFill>
+                  <a:schemeClr val="accent6"/>
+                </a:solidFill>
+              </a:rPr>
+              <a:t> </a:t>
+            </a:r>
+            <a:r>
+              <a:rPr lang="en-US" dirty="0"/>
+              <a:t>except for limited blocks of code</a:t>
+            </a:r>
+          </a:p>
+          <a:p>
+            <a:pPr marL="171450" lvl="0" indent="-171450">
+              <a:buFont typeface="Arial" panose="020B0604020202020204" pitchFamily="34" charset="0"/>
+              <a:buChar char="•"/>
+            </a:pPr>
+            <a:r>
+              <a:rPr lang="en-US" dirty="0"/>
+              <a:t>(much like loop invariants from 2110)</a:t>
+            </a:r>
+          </a:p>
+          <a:p>
+            <a:pPr marL="171450" lvl="0" indent="-171450">
+              <a:buFont typeface="Arial" panose="020B0604020202020204" pitchFamily="34" charset="0"/>
+              <a:buChar char="•"/>
+            </a:pPr>
+            <a:r>
+              <a:rPr lang="en-US" dirty="0"/>
+              <a:t>RI is implicitly part of pre- and post-conditions</a:t>
+            </a:r>
+          </a:p>
+          <a:p>
+            <a:pPr marL="171450" lvl="0" indent="-171450">
+              <a:buFont typeface="Arial" panose="020B0604020202020204" pitchFamily="34" charset="0"/>
+              <a:buChar char="•"/>
+            </a:pPr>
+            <a:r>
+              <a:rPr lang="en-US" dirty="0"/>
+              <a:t>operations may violate it temporarily (e.g., construct a list with duplicates then throw out the duplicates)</a:t>
+            </a:r>
+          </a:p>
+          <a:p>
+            <a:pPr marL="0" lvl="0" indent="0">
+              <a:buFont typeface="Arial" panose="020B0604020202020204" pitchFamily="34" charset="0"/>
+              <a:buNone/>
+            </a:pPr>
+            <a:endParaRPr lang="en-US" dirty="0"/>
+          </a:p>
+          <a:p>
+            <a:pPr marL="0" lvl="0" indent="0">
+              <a:buFont typeface="Arial" panose="020B0604020202020204" pitchFamily="34" charset="0"/>
+              <a:buNone/>
+            </a:pPr>
+            <a:r>
+              <a:rPr lang="en-US" dirty="0"/>
+              <a:t>Demo:  </a:t>
+            </a:r>
+            <a:r>
+              <a:rPr lang="en-US" dirty="0">
+                <a:solidFill>
+                  <a:schemeClr val="accent6"/>
+                </a:solidFill>
+              </a:rPr>
+              <a:t>Consider implementing [union] in both.</a:t>
+            </a:r>
+          </a:p>
+          <a:p>
+            <a:pPr marL="171450" lvl="0" indent="-171450">
+              <a:buFont typeface="Arial" panose="020B0604020202020204" pitchFamily="34" charset="0"/>
+              <a:buChar char="•"/>
+            </a:pPr>
+            <a:r>
+              <a:rPr lang="en-US" dirty="0">
+                <a:solidFill>
+                  <a:schemeClr val="accent6"/>
+                </a:solidFill>
+              </a:rPr>
+              <a:t>[</a:t>
+            </a:r>
+            <a:r>
+              <a:rPr lang="en-US" dirty="0" err="1">
+                <a:solidFill>
+                  <a:schemeClr val="accent6"/>
+                </a:solidFill>
+              </a:rPr>
+              <a:t>ListSetNoDups</a:t>
+            </a:r>
+            <a:r>
+              <a:rPr lang="en-US" dirty="0">
+                <a:solidFill>
+                  <a:schemeClr val="accent6"/>
+                </a:solidFill>
+              </a:rPr>
+              <a:t>] requires deduplication:  temporarily a list constructed with dups, but remove them</a:t>
+            </a:r>
+          </a:p>
+          <a:p>
+            <a:pPr marL="171450" lvl="0" indent="-171450">
+              <a:buFont typeface="Arial" panose="020B0604020202020204" pitchFamily="34" charset="0"/>
+              <a:buChar char="•"/>
+            </a:pPr>
+            <a:r>
+              <a:rPr lang="en-US" dirty="0">
+                <a:solidFill>
+                  <a:schemeClr val="accent6"/>
+                </a:solidFill>
+              </a:rPr>
+              <a:t>[</a:t>
+            </a:r>
+            <a:r>
+              <a:rPr lang="en-US" dirty="0" err="1">
+                <a:solidFill>
+                  <a:schemeClr val="accent6"/>
+                </a:solidFill>
+              </a:rPr>
+              <a:t>ListSetDups</a:t>
+            </a:r>
+            <a:r>
+              <a:rPr lang="en-US" dirty="0">
+                <a:solidFill>
+                  <a:schemeClr val="accent6"/>
+                </a:solidFill>
+              </a:rPr>
+              <a:t>] does not require deduplication</a:t>
+            </a:r>
+          </a:p>
+          <a:p>
+            <a:endParaRPr lang="en-US" dirty="0"/>
           </a:p>
         </p:txBody>
       </p:sp>
@@ -1851,7 +1860,7 @@
     </p:spTree>
     <p:extLst>
       <p:ext uri="{BB962C8B-B14F-4D97-AF65-F5344CB8AC3E}">
-        <p14:creationId xmlns:p14="http://schemas.microsoft.com/office/powerpoint/2010/main" val="825550122"/>
+        <p14:creationId xmlns:p14="http://schemas.microsoft.com/office/powerpoint/2010/main" val="3196639281"/>
       </p:ext>
     </p:extLst>
   </p:cSld>
@@ -1992,7 +2001,10 @@
           <a:bodyPr/>
           <a:lstStyle/>
           <a:p>
-            <a:endParaRPr lang="en-US" dirty="0"/>
+            <a:r>
+              <a:rPr lang="en-US" dirty="0"/>
+              <a:t>Example with sets in textbook</a:t>
+            </a:r>
           </a:p>
         </p:txBody>
       </p:sp>
@@ -2003,7 +2015,7 @@
             <a:spLocks noGrp="1"/>
           </p:cNvSpPr>
           <p:nvPr>
-            <p:ph type="sldNum" sz="quarter" idx="10"/>
+            <p:ph type="sldNum" sz="quarter" idx="5"/>
           </p:nvPr>
         </p:nvSpPr>
         <p:spPr/>
@@ -2014,6 +2026,90 @@
             <a:fld id="{B7975FD5-AB21-4C45-BFE8-1D3F02B463E2}" type="slidenum">
               <a:rPr lang="en-US" smtClean="0"/>
               <a:t>32</a:t>
+            </a:fld>
+            <a:endParaRPr lang="en-US"/>
+          </a:p>
+        </p:txBody>
+      </p:sp>
+    </p:spTree>
+    <p:extLst>
+      <p:ext uri="{BB962C8B-B14F-4D97-AF65-F5344CB8AC3E}">
+        <p14:creationId xmlns:p14="http://schemas.microsoft.com/office/powerpoint/2010/main" val="825550122"/>
+      </p:ext>
+    </p:extLst>
+  </p:cSld>
+  <p:clrMapOvr>
+    <a:masterClrMapping/>
+  </p:clrMapOvr>
+</p:notes>
+</file>
+
+<file path=ppt/notesSlides/notesSlide21.xml><?xml version="1.0" encoding="utf-8"?>
+<p:notes xmlns:a="http://schemas.openxmlformats.org/drawingml/2006/main" xmlns:r="http://schemas.openxmlformats.org/officeDocument/2006/relationships" xmlns:p="http://schemas.openxmlformats.org/presentationml/2006/main">
+  <p:cSld>
+    <p:spTree>
+      <p:nvGrpSpPr>
+        <p:cNvPr id="1" name=""/>
+        <p:cNvGrpSpPr/>
+        <p:nvPr/>
+      </p:nvGrpSpPr>
+      <p:grpSpPr>
+        <a:xfrm>
+          <a:off x="0" y="0"/>
+          <a:ext cx="0" cy="0"/>
+          <a:chOff x="0" y="0"/>
+          <a:chExt cx="0" cy="0"/>
+        </a:xfrm>
+      </p:grpSpPr>
+      <p:sp>
+        <p:nvSpPr>
+          <p:cNvPr id="2" name="Slide Image Placeholder 1"/>
+          <p:cNvSpPr>
+            <a:spLocks noGrp="1" noRot="1" noChangeAspect="1"/>
+          </p:cNvSpPr>
+          <p:nvPr>
+            <p:ph type="sldImg"/>
+          </p:nvPr>
+        </p:nvSpPr>
+        <p:spPr/>
+      </p:sp>
+      <p:sp>
+        <p:nvSpPr>
+          <p:cNvPr id="3" name="Notes Placeholder 2"/>
+          <p:cNvSpPr>
+            <a:spLocks noGrp="1"/>
+          </p:cNvSpPr>
+          <p:nvPr>
+            <p:ph type="body" idx="1"/>
+          </p:nvPr>
+        </p:nvSpPr>
+        <p:spPr/>
+        <p:txBody>
+          <a:bodyPr/>
+          <a:lstStyle/>
+          <a:p>
+            <a:endParaRPr lang="en-US" dirty="0"/>
+          </a:p>
+        </p:txBody>
+      </p:sp>
+      <p:sp>
+        <p:nvSpPr>
+          <p:cNvPr id="4" name="Slide Number Placeholder 3"/>
+          <p:cNvSpPr>
+            <a:spLocks noGrp="1"/>
+          </p:cNvSpPr>
+          <p:nvPr>
+            <p:ph type="sldNum" sz="quarter" idx="10"/>
+          </p:nvPr>
+        </p:nvSpPr>
+        <p:spPr/>
+        <p:txBody>
+          <a:bodyPr/>
+          <a:lstStyle/>
+          <a:p>
+            <a:fld id="{B7975FD5-AB21-4C45-BFE8-1D3F02B463E2}" type="slidenum">
+              <a:rPr lang="en-US" smtClean="0"/>
+              <a:t>33</a:t>
             </a:fld>
             <a:endParaRPr lang="en-US"/>
           </a:p>
@@ -2872,7 +2968,7 @@
           <a:p>
             <a:fld id="{96331252-4874-F047-84B8-3D3EF8743E79}" type="datetimeFigureOut">
               <a:rPr lang="en-US" smtClean="0"/>
-              <a:t>9/24/19</a:t>
+              <a:t>9/25/19</a:t>
             </a:fld>
             <a:endParaRPr lang="en-US"/>
           </a:p>
@@ -3139,7 +3235,7 @@
           <a:p>
             <a:fld id="{96331252-4874-F047-84B8-3D3EF8743E79}" type="datetimeFigureOut">
               <a:rPr lang="en-US" smtClean="0"/>
-              <a:t>9/24/19</a:t>
+              <a:t>9/25/19</a:t>
             </a:fld>
             <a:endParaRPr lang="en-US"/>
           </a:p>
@@ -3317,7 +3413,7 @@
           <a:p>
             <a:fld id="{96331252-4874-F047-84B8-3D3EF8743E79}" type="datetimeFigureOut">
               <a:rPr lang="en-US" smtClean="0"/>
-              <a:t>9/24/19</a:t>
+              <a:t>9/25/19</a:t>
             </a:fld>
             <a:endParaRPr lang="en-US"/>
           </a:p>
@@ -3493,7 +3589,7 @@
           <a:p>
             <a:fld id="{96331252-4874-F047-84B8-3D3EF8743E79}" type="datetimeFigureOut">
               <a:rPr lang="en-US" smtClean="0"/>
-              <a:t>9/24/19</a:t>
+              <a:t>9/25/19</a:t>
             </a:fld>
             <a:endParaRPr lang="en-US"/>
           </a:p>
@@ -3742,7 +3838,7 @@
           <a:p>
             <a:fld id="{96331252-4874-F047-84B8-3D3EF8743E79}" type="datetimeFigureOut">
               <a:rPr lang="en-US" smtClean="0"/>
-              <a:t>9/24/19</a:t>
+              <a:t>9/25/19</a:t>
             </a:fld>
             <a:endParaRPr lang="en-US"/>
           </a:p>
@@ -4027,7 +4123,7 @@
           <a:p>
             <a:fld id="{96331252-4874-F047-84B8-3D3EF8743E79}" type="datetimeFigureOut">
               <a:rPr lang="en-US" smtClean="0"/>
-              <a:t>9/24/19</a:t>
+              <a:t>9/25/19</a:t>
             </a:fld>
             <a:endParaRPr lang="en-US"/>
           </a:p>
@@ -4446,7 +4542,7 @@
           <a:p>
             <a:fld id="{96331252-4874-F047-84B8-3D3EF8743E79}" type="datetimeFigureOut">
               <a:rPr lang="en-US" smtClean="0"/>
-              <a:t>9/24/19</a:t>
+              <a:t>9/25/19</a:t>
             </a:fld>
             <a:endParaRPr lang="en-US"/>
           </a:p>
@@ -4563,7 +4659,7 @@
           <a:p>
             <a:fld id="{96331252-4874-F047-84B8-3D3EF8743E79}" type="datetimeFigureOut">
               <a:rPr lang="en-US" smtClean="0"/>
-              <a:t>9/24/19</a:t>
+              <a:t>9/25/19</a:t>
             </a:fld>
             <a:endParaRPr lang="en-US"/>
           </a:p>
@@ -4658,7 +4754,7 @@
           <a:p>
             <a:fld id="{96331252-4874-F047-84B8-3D3EF8743E79}" type="datetimeFigureOut">
               <a:rPr lang="en-US" smtClean="0"/>
-              <a:t>9/24/19</a:t>
+              <a:t>9/25/19</a:t>
             </a:fld>
             <a:endParaRPr lang="en-US"/>
           </a:p>
@@ -4933,7 +5029,7 @@
           <a:p>
             <a:fld id="{96331252-4874-F047-84B8-3D3EF8743E79}" type="datetimeFigureOut">
               <a:rPr lang="en-US" smtClean="0"/>
-              <a:t>9/24/19</a:t>
+              <a:t>9/25/19</a:t>
             </a:fld>
             <a:endParaRPr lang="en-US"/>
           </a:p>
@@ -5185,7 +5281,7 @@
           <a:p>
             <a:fld id="{96331252-4874-F047-84B8-3D3EF8743E79}" type="datetimeFigureOut">
               <a:rPr lang="en-US" smtClean="0"/>
-              <a:t>9/24/19</a:t>
+              <a:t>9/25/19</a:t>
             </a:fld>
             <a:endParaRPr lang="en-US"/>
           </a:p>
@@ -5399,7 +5495,7 @@
             <a:fld id="{96331252-4874-F047-84B8-3D3EF8743E79}" type="datetimeFigureOut">
               <a:rPr lang="en-US" smtClean="0"/>
               <a:pPr/>
-              <a:t>9/24/19</a:t>
+              <a:t>9/25/19</a:t>
             </a:fld>
             <a:endParaRPr lang="en-US"/>
           </a:p>
@@ -6727,91 +6823,151 @@
       </p:grpSpPr>
       <p:sp>
         <p:nvSpPr>
-          <p:cNvPr id="4" name="Title 3"/>
-          <p:cNvSpPr>
-            <a:spLocks noGrp="1"/>
-          </p:cNvSpPr>
-          <p:nvPr>
-            <p:ph type="title"/>
-          </p:nvPr>
-        </p:nvSpPr>
-        <p:spPr/>
-        <p:txBody>
-          <a:bodyPr/>
-          <a:lstStyle/>
-          <a:p>
-            <a:r>
-              <a:rPr lang="en-US" dirty="0"/>
-              <a:t>Specifying Data Abstractions</a:t>
-            </a:r>
-          </a:p>
-        </p:txBody>
-      </p:sp>
-      <p:sp>
-        <p:nvSpPr>
-          <p:cNvPr id="5" name="Text Placeholder 4"/>
-          <p:cNvSpPr>
-            <a:spLocks noGrp="1"/>
-          </p:cNvSpPr>
-          <p:nvPr>
-            <p:ph type="body" idx="1"/>
-          </p:nvPr>
-        </p:nvSpPr>
-        <p:spPr/>
-        <p:txBody>
-          <a:bodyPr/>
-          <a:lstStyle/>
-          <a:p>
-            <a:endParaRPr lang="en-US"/>
-          </a:p>
-        </p:txBody>
-      </p:sp>
-      <p:sp>
-        <p:nvSpPr>
-          <p:cNvPr id="6" name="TextBox 5">
+          <p:cNvPr id="2" name="Title 1">
             <a:extLst>
               <a:ext uri="{FF2B5EF4-FFF2-40B4-BE49-F238E27FC236}">
-                <a16:creationId xmlns:a16="http://schemas.microsoft.com/office/drawing/2014/main" id="{97769C3F-1B26-9D40-9841-828A9639C8A9}"/>
+                <a16:creationId xmlns:a16="http://schemas.microsoft.com/office/drawing/2014/main" id="{DDDCDA98-0DA6-9E4E-8DDB-D639840CDD70}"/>
               </a:ext>
             </a:extLst>
           </p:cNvPr>
-          <p:cNvSpPr txBox="1"/>
-          <p:nvPr/>
-        </p:nvSpPr>
-        <p:spPr>
-          <a:xfrm>
-            <a:off x="7820832" y="6094812"/>
-            <a:ext cx="914033" cy="461665"/>
-          </a:xfrm>
-          <a:prstGeom prst="rect">
-            <a:avLst/>
-          </a:prstGeom>
-          <a:noFill/>
-        </p:spPr>
-        <p:txBody>
-          <a:bodyPr wrap="square" rtlCol="0">
-            <a:spAutoFit/>
-          </a:bodyPr>
-          <a:lstStyle/>
-          <a:p>
-            <a:r>
-              <a:rPr lang="en-US" sz="2400" dirty="0">
+          <p:cNvSpPr>
+            <a:spLocks noGrp="1"/>
+          </p:cNvSpPr>
+          <p:nvPr>
+            <p:ph type="title"/>
+          </p:nvPr>
+        </p:nvSpPr>
+        <p:spPr/>
+        <p:txBody>
+          <a:bodyPr/>
+          <a:lstStyle/>
+          <a:p>
+            <a:r>
+              <a:rPr lang="en-US" dirty="0"/>
+              <a:t>Data abstraction</a:t>
+            </a:r>
+          </a:p>
+        </p:txBody>
+      </p:sp>
+      <p:sp>
+        <p:nvSpPr>
+          <p:cNvPr id="3" name="Content Placeholder 2">
+            <a:extLst>
+              <a:ext uri="{FF2B5EF4-FFF2-40B4-BE49-F238E27FC236}">
+                <a16:creationId xmlns:a16="http://schemas.microsoft.com/office/drawing/2014/main" id="{95280F0A-A3C0-674A-84F0-2948D754C1A4}"/>
+              </a:ext>
+            </a:extLst>
+          </p:cNvPr>
+          <p:cNvSpPr>
+            <a:spLocks noGrp="1"/>
+          </p:cNvSpPr>
+          <p:nvPr>
+            <p:ph idx="1"/>
+          </p:nvPr>
+        </p:nvSpPr>
+        <p:spPr/>
+        <p:txBody>
+          <a:bodyPr/>
+          <a:lstStyle/>
+          <a:p>
+            <a:r>
+              <a:rPr lang="en-US" dirty="0"/>
+              <a:t>A </a:t>
+            </a:r>
+            <a:r>
+              <a:rPr lang="en-US" dirty="0">
                 <a:solidFill>
-                  <a:schemeClr val="bg2">
-                    <a:lumMod val="50000"/>
-                  </a:schemeClr>
+                  <a:schemeClr val="accent1"/>
                 </a:solidFill>
-                <a:latin typeface="Cronos Pro" panose="020C0502030403020304" pitchFamily="34" charset="77"/>
               </a:rPr>
-              <a:t>Demo</a:t>
-            </a:r>
+              <a:t>data abstraction </a:t>
+            </a:r>
+            <a:r>
+              <a:rPr lang="en-US" dirty="0"/>
+              <a:t>is a specification of operations on a set of values</a:t>
+            </a:r>
+          </a:p>
+          <a:p>
+            <a:pPr lvl="1"/>
+            <a:r>
+              <a:rPr lang="en-US" dirty="0"/>
+              <a:t>e.g., stacks have push, pop, peek, etc.; we don’t know what the values concretely are</a:t>
+            </a:r>
+          </a:p>
+          <a:p>
+            <a:r>
+              <a:rPr lang="en-US" dirty="0"/>
+              <a:t>A </a:t>
+            </a:r>
+            <a:r>
+              <a:rPr lang="en-US" dirty="0">
+                <a:solidFill>
+                  <a:schemeClr val="accent1"/>
+                </a:solidFill>
+              </a:rPr>
+              <a:t>data structure </a:t>
+            </a:r>
+            <a:r>
+              <a:rPr lang="en-US" dirty="0"/>
+              <a:t>is an implementation of a data abstraction with a particular representation</a:t>
+            </a:r>
+          </a:p>
+          <a:p>
+            <a:pPr lvl="1"/>
+            <a:r>
+              <a:rPr lang="en-US" dirty="0"/>
+              <a:t>e.g., </a:t>
+            </a:r>
+            <a:r>
+              <a:rPr lang="en-US" dirty="0" err="1">
+                <a:latin typeface="Courier" pitchFamily="2" charset="0"/>
+              </a:rPr>
+              <a:t>ListStack</a:t>
+            </a:r>
+            <a:r>
+              <a:rPr lang="en-US" dirty="0"/>
+              <a:t> implemented </a:t>
+            </a:r>
+            <a:r>
+              <a:rPr lang="en-US" dirty="0" err="1">
+                <a:latin typeface="Courier" pitchFamily="2" charset="0"/>
+              </a:rPr>
+              <a:t>StackSig</a:t>
+            </a:r>
+            <a:r>
+              <a:rPr lang="en-US" dirty="0"/>
+              <a:t> with </a:t>
+            </a:r>
+            <a:r>
+              <a:rPr lang="en-US" dirty="0">
+                <a:latin typeface="Courier" pitchFamily="2" charset="0"/>
+              </a:rPr>
+              <a:t>‘a list</a:t>
+            </a:r>
+            <a:r>
+              <a:rPr lang="en-US" dirty="0"/>
+              <a:t>, </a:t>
+            </a:r>
+            <a:r>
+              <a:rPr lang="en-US" dirty="0">
+                <a:latin typeface="Courier" pitchFamily="2" charset="0"/>
+              </a:rPr>
+              <a:t>(::)</a:t>
+            </a:r>
+            <a:r>
+              <a:rPr lang="en-US" dirty="0"/>
+              <a:t>, etc.</a:t>
+            </a:r>
+          </a:p>
+          <a:p>
+            <a:endParaRPr lang="en-US" dirty="0"/>
           </a:p>
         </p:txBody>
       </p:sp>
     </p:spTree>
     <p:extLst>
       <p:ext uri="{BB962C8B-B14F-4D97-AF65-F5344CB8AC3E}">
-        <p14:creationId xmlns:p14="http://schemas.microsoft.com/office/powerpoint/2010/main" val="1305385801"/>
+        <p14:creationId xmlns:p14="http://schemas.microsoft.com/office/powerpoint/2010/main" val="1237614496"/>
       </p:ext>
     </p:extLst>
   </p:cSld>
@@ -6840,61 +6996,91 @@
       </p:grpSpPr>
       <p:sp>
         <p:nvSpPr>
-          <p:cNvPr id="4" name="Title 3">
+          <p:cNvPr id="4" name="Title 3"/>
+          <p:cNvSpPr>
+            <a:spLocks noGrp="1"/>
+          </p:cNvSpPr>
+          <p:nvPr>
+            <p:ph type="title"/>
+          </p:nvPr>
+        </p:nvSpPr>
+        <p:spPr/>
+        <p:txBody>
+          <a:bodyPr/>
+          <a:lstStyle/>
+          <a:p>
+            <a:r>
+              <a:rPr lang="en-US" dirty="0"/>
+              <a:t>Specifying Data Abstractions</a:t>
+            </a:r>
+          </a:p>
+        </p:txBody>
+      </p:sp>
+      <p:sp>
+        <p:nvSpPr>
+          <p:cNvPr id="5" name="Text Placeholder 4"/>
+          <p:cNvSpPr>
+            <a:spLocks noGrp="1"/>
+          </p:cNvSpPr>
+          <p:nvPr>
+            <p:ph type="body" idx="1"/>
+          </p:nvPr>
+        </p:nvSpPr>
+        <p:spPr/>
+        <p:txBody>
+          <a:bodyPr/>
+          <a:lstStyle/>
+          <a:p>
+            <a:endParaRPr lang="en-US"/>
+          </a:p>
+        </p:txBody>
+      </p:sp>
+      <p:sp>
+        <p:nvSpPr>
+          <p:cNvPr id="6" name="TextBox 5">
             <a:extLst>
               <a:ext uri="{FF2B5EF4-FFF2-40B4-BE49-F238E27FC236}">
-                <a16:creationId xmlns:a16="http://schemas.microsoft.com/office/drawing/2014/main" id="{54F51C8C-F520-5440-991C-A1DA3168BC67}"/>
+                <a16:creationId xmlns:a16="http://schemas.microsoft.com/office/drawing/2014/main" id="{97769C3F-1B26-9D40-9841-828A9639C8A9}"/>
               </a:ext>
             </a:extLst>
           </p:cNvPr>
-          <p:cNvSpPr>
-            <a:spLocks noGrp="1"/>
-          </p:cNvSpPr>
-          <p:nvPr>
-            <p:ph type="title"/>
-          </p:nvPr>
-        </p:nvSpPr>
-        <p:spPr/>
-        <p:txBody>
-          <a:bodyPr/>
-          <a:lstStyle/>
-          <a:p>
-            <a:r>
-              <a:rPr lang="en-US" dirty="0"/>
-              <a:t>Clicker Question 2</a:t>
-            </a:r>
-          </a:p>
-        </p:txBody>
-      </p:sp>
-      <p:sp>
-        <p:nvSpPr>
-          <p:cNvPr id="5" name="Text Placeholder 4">
-            <a:extLst>
-              <a:ext uri="{FF2B5EF4-FFF2-40B4-BE49-F238E27FC236}">
-                <a16:creationId xmlns:a16="http://schemas.microsoft.com/office/drawing/2014/main" id="{02878FC7-10E0-F94F-AA96-B6F0E9DEA3CF}"/>
-              </a:ext>
-            </a:extLst>
-          </p:cNvPr>
-          <p:cNvSpPr>
-            <a:spLocks noGrp="1"/>
-          </p:cNvSpPr>
-          <p:nvPr>
-            <p:ph type="body" idx="1"/>
-          </p:nvPr>
-        </p:nvSpPr>
-        <p:spPr/>
-        <p:txBody>
-          <a:bodyPr/>
-          <a:lstStyle/>
-          <a:p>
-            <a:endParaRPr lang="en-US"/>
+          <p:cNvSpPr txBox="1"/>
+          <p:nvPr/>
+        </p:nvSpPr>
+        <p:spPr>
+          <a:xfrm>
+            <a:off x="7820832" y="6094812"/>
+            <a:ext cx="914033" cy="461665"/>
+          </a:xfrm>
+          <a:prstGeom prst="rect">
+            <a:avLst/>
+          </a:prstGeom>
+          <a:noFill/>
+        </p:spPr>
+        <p:txBody>
+          <a:bodyPr wrap="square" rtlCol="0">
+            <a:spAutoFit/>
+          </a:bodyPr>
+          <a:lstStyle/>
+          <a:p>
+            <a:r>
+              <a:rPr lang="en-US" sz="2400" dirty="0">
+                <a:solidFill>
+                  <a:schemeClr val="bg2">
+                    <a:lumMod val="50000"/>
+                  </a:schemeClr>
+                </a:solidFill>
+                <a:latin typeface="Cronos Pro" panose="020C0502030403020304" pitchFamily="34" charset="77"/>
+              </a:rPr>
+              <a:t>Demo</a:t>
+            </a:r>
           </a:p>
         </p:txBody>
       </p:sp>
     </p:spTree>
     <p:extLst>
       <p:ext uri="{BB962C8B-B14F-4D97-AF65-F5344CB8AC3E}">
-        <p14:creationId xmlns:p14="http://schemas.microsoft.com/office/powerpoint/2010/main" val="666628426"/>
+        <p14:creationId xmlns:p14="http://schemas.microsoft.com/office/powerpoint/2010/main" val="1305385801"/>
       </p:ext>
     </p:extLst>
   </p:cSld>
@@ -6923,7 +7109,13 @@
       </p:grpSpPr>
       <p:sp>
         <p:nvSpPr>
-          <p:cNvPr id="2" name="Title 1"/>
+          <p:cNvPr id="4" name="Title 3">
+            <a:extLst>
+              <a:ext uri="{FF2B5EF4-FFF2-40B4-BE49-F238E27FC236}">
+                <a16:creationId xmlns:a16="http://schemas.microsoft.com/office/drawing/2014/main" id="{54F51C8C-F520-5440-991C-A1DA3168BC67}"/>
+              </a:ext>
+            </a:extLst>
+          </p:cNvPr>
           <p:cNvSpPr>
             <a:spLocks noGrp="1"/>
           </p:cNvSpPr>
@@ -6933,26 +7125,30 @@
         </p:nvSpPr>
         <p:spPr/>
         <p:txBody>
-          <a:bodyPr>
-            <a:normAutofit/>
-          </a:bodyPr>
+          <a:bodyPr/>
           <a:lstStyle/>
           <a:p>
             <a:r>
               <a:rPr lang="en-US" dirty="0"/>
-              <a:t>Representation types</a:t>
-            </a:r>
-          </a:p>
-        </p:txBody>
-      </p:sp>
-      <p:sp>
-        <p:nvSpPr>
-          <p:cNvPr id="3" name="Content Placeholder 2"/>
-          <p:cNvSpPr>
-            <a:spLocks noGrp="1"/>
-          </p:cNvSpPr>
-          <p:nvPr>
-            <p:ph idx="1"/>
+              <a:t>Clicker Question 2</a:t>
+            </a:r>
+          </a:p>
+        </p:txBody>
+      </p:sp>
+      <p:sp>
+        <p:nvSpPr>
+          <p:cNvPr id="5" name="Text Placeholder 4">
+            <a:extLst>
+              <a:ext uri="{FF2B5EF4-FFF2-40B4-BE49-F238E27FC236}">
+                <a16:creationId xmlns:a16="http://schemas.microsoft.com/office/drawing/2014/main" id="{02878FC7-10E0-F94F-AA96-B6F0E9DEA3CF}"/>
+              </a:ext>
+            </a:extLst>
+          </p:cNvPr>
+          <p:cNvSpPr>
+            <a:spLocks noGrp="1"/>
+          </p:cNvSpPr>
+          <p:nvPr>
+            <p:ph type="body" idx="1"/>
           </p:nvPr>
         </p:nvSpPr>
         <p:spPr/>
@@ -6960,94 +7156,14 @@
           <a:bodyPr/>
           <a:lstStyle/>
           <a:p>
-            <a:r>
-              <a:rPr lang="en-US" b="1" dirty="0"/>
-              <a:t>Q:</a:t>
-            </a:r>
-            <a:r>
-              <a:rPr lang="en-US" dirty="0"/>
-              <a:t>  How to </a:t>
-            </a:r>
-            <a:r>
-              <a:rPr lang="en-US" dirty="0">
-                <a:solidFill>
-                  <a:schemeClr val="accent1"/>
-                </a:solidFill>
-              </a:rPr>
-              <a:t>interpret</a:t>
-            </a:r>
-            <a:r>
-              <a:rPr lang="en-US" dirty="0"/>
-              <a:t> the representation type as the data abstraction?</a:t>
-            </a:r>
-          </a:p>
-          <a:p>
-            <a:r>
-              <a:rPr lang="en-US" b="1" dirty="0">
-                <a:solidFill>
-                  <a:schemeClr val="accent2"/>
-                </a:solidFill>
-              </a:rPr>
-              <a:t>A:</a:t>
-            </a:r>
-            <a:r>
-              <a:rPr lang="en-US" dirty="0">
-                <a:solidFill>
-                  <a:schemeClr val="accent2"/>
-                </a:solidFill>
-              </a:rPr>
-              <a:t>  Abstraction function</a:t>
-            </a:r>
-          </a:p>
-          <a:p>
-            <a:endParaRPr lang="en-US" dirty="0"/>
-          </a:p>
-          <a:p>
-            <a:r>
-              <a:rPr lang="en-US" b="1" dirty="0"/>
-              <a:t>Q:</a:t>
-            </a:r>
-            <a:r>
-              <a:rPr lang="en-US" dirty="0"/>
-              <a:t>  How to determine which values of representation type are </a:t>
-            </a:r>
-            <a:r>
-              <a:rPr lang="en-US" dirty="0">
-                <a:solidFill>
-                  <a:schemeClr val="accent1"/>
-                </a:solidFill>
-              </a:rPr>
-              <a:t>meaningful</a:t>
-            </a:r>
-            <a:r>
-              <a:rPr lang="en-US" dirty="0"/>
-              <a:t>?</a:t>
-            </a:r>
-          </a:p>
-          <a:p>
-            <a:r>
-              <a:rPr lang="en-US" b="1" dirty="0">
-                <a:solidFill>
-                  <a:srgbClr val="C0504D"/>
-                </a:solidFill>
-              </a:rPr>
-              <a:t>A:</a:t>
-            </a:r>
-            <a:r>
-              <a:rPr lang="en-US" dirty="0">
-                <a:solidFill>
-                  <a:srgbClr val="C0504D"/>
-                </a:solidFill>
-              </a:rPr>
-              <a:t>  Representation invariant</a:t>
-            </a:r>
+            <a:endParaRPr lang="en-US"/>
           </a:p>
         </p:txBody>
       </p:sp>
     </p:spTree>
     <p:extLst>
       <p:ext uri="{BB962C8B-B14F-4D97-AF65-F5344CB8AC3E}">
-        <p14:creationId xmlns:p14="http://schemas.microsoft.com/office/powerpoint/2010/main" val="42701766"/>
+        <p14:creationId xmlns:p14="http://schemas.microsoft.com/office/powerpoint/2010/main" val="666628426"/>
       </p:ext>
     </p:extLst>
   </p:cSld>
@@ -7076,6 +7192,159 @@
       </p:grpSpPr>
       <p:sp>
         <p:nvSpPr>
+          <p:cNvPr id="2" name="Title 1"/>
+          <p:cNvSpPr>
+            <a:spLocks noGrp="1"/>
+          </p:cNvSpPr>
+          <p:nvPr>
+            <p:ph type="title"/>
+          </p:nvPr>
+        </p:nvSpPr>
+        <p:spPr/>
+        <p:txBody>
+          <a:bodyPr>
+            <a:normAutofit/>
+          </a:bodyPr>
+          <a:lstStyle/>
+          <a:p>
+            <a:r>
+              <a:rPr lang="en-US" dirty="0"/>
+              <a:t>Representation types</a:t>
+            </a:r>
+          </a:p>
+        </p:txBody>
+      </p:sp>
+      <p:sp>
+        <p:nvSpPr>
+          <p:cNvPr id="3" name="Content Placeholder 2"/>
+          <p:cNvSpPr>
+            <a:spLocks noGrp="1"/>
+          </p:cNvSpPr>
+          <p:nvPr>
+            <p:ph idx="1"/>
+          </p:nvPr>
+        </p:nvSpPr>
+        <p:spPr/>
+        <p:txBody>
+          <a:bodyPr/>
+          <a:lstStyle/>
+          <a:p>
+            <a:r>
+              <a:rPr lang="en-US" b="1" dirty="0"/>
+              <a:t>Q:</a:t>
+            </a:r>
+            <a:r>
+              <a:rPr lang="en-US" dirty="0"/>
+              <a:t>  How to </a:t>
+            </a:r>
+            <a:r>
+              <a:rPr lang="en-US" dirty="0">
+                <a:solidFill>
+                  <a:schemeClr val="accent1"/>
+                </a:solidFill>
+              </a:rPr>
+              <a:t>interpret</a:t>
+            </a:r>
+            <a:r>
+              <a:rPr lang="en-US" dirty="0"/>
+              <a:t> the representation type as the data abstraction?</a:t>
+            </a:r>
+          </a:p>
+          <a:p>
+            <a:r>
+              <a:rPr lang="en-US" b="1" dirty="0">
+                <a:solidFill>
+                  <a:schemeClr val="accent2"/>
+                </a:solidFill>
+              </a:rPr>
+              <a:t>A:</a:t>
+            </a:r>
+            <a:r>
+              <a:rPr lang="en-US" dirty="0">
+                <a:solidFill>
+                  <a:schemeClr val="accent2"/>
+                </a:solidFill>
+              </a:rPr>
+              <a:t>  Abstraction function</a:t>
+            </a:r>
+          </a:p>
+          <a:p>
+            <a:endParaRPr lang="en-US" dirty="0"/>
+          </a:p>
+          <a:p>
+            <a:r>
+              <a:rPr lang="en-US" b="1" dirty="0"/>
+              <a:t>Q:</a:t>
+            </a:r>
+            <a:r>
+              <a:rPr lang="en-US" dirty="0"/>
+              <a:t>  How to determine which values of representation type are </a:t>
+            </a:r>
+            <a:r>
+              <a:rPr lang="en-US" dirty="0">
+                <a:solidFill>
+                  <a:schemeClr val="accent1"/>
+                </a:solidFill>
+              </a:rPr>
+              <a:t>meaningful</a:t>
+            </a:r>
+            <a:r>
+              <a:rPr lang="en-US" dirty="0"/>
+              <a:t>?</a:t>
+            </a:r>
+          </a:p>
+          <a:p>
+            <a:r>
+              <a:rPr lang="en-US" b="1" dirty="0">
+                <a:solidFill>
+                  <a:srgbClr val="C0504D"/>
+                </a:solidFill>
+              </a:rPr>
+              <a:t>A:</a:t>
+            </a:r>
+            <a:r>
+              <a:rPr lang="en-US" dirty="0">
+                <a:solidFill>
+                  <a:srgbClr val="C0504D"/>
+                </a:solidFill>
+              </a:rPr>
+              <a:t>  Representation invariant</a:t>
+            </a:r>
+          </a:p>
+        </p:txBody>
+      </p:sp>
+    </p:spTree>
+    <p:extLst>
+      <p:ext uri="{BB962C8B-B14F-4D97-AF65-F5344CB8AC3E}">
+        <p14:creationId xmlns:p14="http://schemas.microsoft.com/office/powerpoint/2010/main" val="42701766"/>
+      </p:ext>
+    </p:extLst>
+  </p:cSld>
+  <p:clrMapOvr>
+    <a:masterClrMapping/>
+  </p:clrMapOvr>
+</p:sld>
+</file>
+
+<file path=ppt/slides/slide19.xml><?xml version="1.0" encoding="utf-8"?>
+<p:sld xmlns:a="http://schemas.openxmlformats.org/drawingml/2006/main" xmlns:r="http://schemas.openxmlformats.org/officeDocument/2006/relationships" xmlns:p="http://schemas.openxmlformats.org/presentationml/2006/main">
+  <p:cSld>
+    <p:spTree>
+      <p:nvGrpSpPr>
+        <p:cNvPr id="1" name=""/>
+        <p:cNvGrpSpPr/>
+        <p:nvPr/>
+      </p:nvGrpSpPr>
+      <p:grpSpPr>
+        <a:xfrm>
+          <a:off x="0" y="0"/>
+          <a:ext cx="0" cy="0"/>
+          <a:chOff x="0" y="0"/>
+          <a:chExt cx="0" cy="0"/>
+        </a:xfrm>
+      </p:grpSpPr>
+      <p:sp>
+        <p:nvSpPr>
           <p:cNvPr id="4" name="Title 3">
             <a:extLst>
               <a:ext uri="{FF2B5EF4-FFF2-40B4-BE49-F238E27FC236}">
@@ -7140,7 +7409,90 @@
 </p:sld>
 </file>
 
-<file path=ppt/slides/slide19.xml><?xml version="1.0" encoding="utf-8"?>
+<file path=ppt/slides/slide2.xml><?xml version="1.0" encoding="utf-8"?>
+<p:sld xmlns:a="http://schemas.openxmlformats.org/drawingml/2006/main" xmlns:r="http://schemas.openxmlformats.org/officeDocument/2006/relationships" xmlns:p="http://schemas.openxmlformats.org/presentationml/2006/main">
+  <p:cSld>
+    <p:spTree>
+      <p:nvGrpSpPr>
+        <p:cNvPr id="1" name=""/>
+        <p:cNvGrpSpPr/>
+        <p:nvPr/>
+      </p:nvGrpSpPr>
+      <p:grpSpPr>
+        <a:xfrm>
+          <a:off x="0" y="0"/>
+          <a:ext cx="0" cy="0"/>
+          <a:chOff x="0" y="0"/>
+          <a:chExt cx="0" cy="0"/>
+        </a:xfrm>
+      </p:grpSpPr>
+      <p:sp>
+        <p:nvSpPr>
+          <p:cNvPr id="4" name="Title 3">
+            <a:extLst>
+              <a:ext uri="{FF2B5EF4-FFF2-40B4-BE49-F238E27FC236}">
+                <a16:creationId xmlns:a16="http://schemas.microsoft.com/office/drawing/2014/main" id="{4CCB0FE4-A03B-8244-A8AD-03946DD41427}"/>
+              </a:ext>
+            </a:extLst>
+          </p:cNvPr>
+          <p:cNvSpPr>
+            <a:spLocks noGrp="1"/>
+          </p:cNvSpPr>
+          <p:nvPr>
+            <p:ph type="title"/>
+          </p:nvPr>
+        </p:nvSpPr>
+        <p:spPr/>
+        <p:txBody>
+          <a:bodyPr/>
+          <a:lstStyle/>
+          <a:p>
+            <a:r>
+              <a:rPr lang="en-US" dirty="0"/>
+              <a:t>Clicker Question 1</a:t>
+            </a:r>
+          </a:p>
+        </p:txBody>
+      </p:sp>
+      <p:sp>
+        <p:nvSpPr>
+          <p:cNvPr id="5" name="Text Placeholder 4">
+            <a:extLst>
+              <a:ext uri="{FF2B5EF4-FFF2-40B4-BE49-F238E27FC236}">
+                <a16:creationId xmlns:a16="http://schemas.microsoft.com/office/drawing/2014/main" id="{9B8EE924-1595-BC46-81AD-0D8DDAEDC371}"/>
+              </a:ext>
+            </a:extLst>
+          </p:cNvPr>
+          <p:cNvSpPr>
+            <a:spLocks noGrp="1"/>
+          </p:cNvSpPr>
+          <p:nvPr>
+            <p:ph type="body" idx="1"/>
+          </p:nvPr>
+        </p:nvSpPr>
+        <p:spPr/>
+        <p:txBody>
+          <a:bodyPr/>
+          <a:lstStyle/>
+          <a:p>
+            <a:endParaRPr lang="en-US"/>
+          </a:p>
+        </p:txBody>
+      </p:sp>
+    </p:spTree>
+    <p:extLst>
+      <p:ext uri="{BB962C8B-B14F-4D97-AF65-F5344CB8AC3E}">
+        <p14:creationId xmlns:p14="http://schemas.microsoft.com/office/powerpoint/2010/main" val="4294053067"/>
+      </p:ext>
+    </p:extLst>
+  </p:cSld>
+  <p:clrMapOvr>
+    <a:masterClrMapping/>
+  </p:clrMapOvr>
+</p:sld>
+</file>
+
+<file path=ppt/slides/slide20.xml><?xml version="1.0" encoding="utf-8"?>
 <p:sld xmlns:a="http://schemas.openxmlformats.org/drawingml/2006/main" xmlns:r="http://schemas.openxmlformats.org/officeDocument/2006/relationships" xmlns:p="http://schemas.openxmlformats.org/presentationml/2006/main">
   <p:cSld>
     <p:spTree>
@@ -8076,217 +8428,6 @@
 </p:sld>
 </file>
 
-<file path=ppt/slides/slide2.xml><?xml version="1.0" encoding="utf-8"?>
-<p:sld xmlns:a="http://schemas.openxmlformats.org/drawingml/2006/main" xmlns:r="http://schemas.openxmlformats.org/officeDocument/2006/relationships" xmlns:p="http://schemas.openxmlformats.org/presentationml/2006/main">
-  <p:cSld>
-    <p:spTree>
-      <p:nvGrpSpPr>
-        <p:cNvPr id="1" name=""/>
-        <p:cNvGrpSpPr/>
-        <p:nvPr/>
-      </p:nvGrpSpPr>
-      <p:grpSpPr>
-        <a:xfrm>
-          <a:off x="0" y="0"/>
-          <a:ext cx="0" cy="0"/>
-          <a:chOff x="0" y="0"/>
-          <a:chExt cx="0" cy="0"/>
-        </a:xfrm>
-      </p:grpSpPr>
-      <p:sp>
-        <p:nvSpPr>
-          <p:cNvPr id="4" name="Title 3">
-            <a:extLst>
-              <a:ext uri="{FF2B5EF4-FFF2-40B4-BE49-F238E27FC236}">
-                <a16:creationId xmlns:a16="http://schemas.microsoft.com/office/drawing/2014/main" id="{4CCB0FE4-A03B-8244-A8AD-03946DD41427}"/>
-              </a:ext>
-            </a:extLst>
-          </p:cNvPr>
-          <p:cNvSpPr>
-            <a:spLocks noGrp="1"/>
-          </p:cNvSpPr>
-          <p:nvPr>
-            <p:ph type="title"/>
-          </p:nvPr>
-        </p:nvSpPr>
-        <p:spPr/>
-        <p:txBody>
-          <a:bodyPr/>
-          <a:lstStyle/>
-          <a:p>
-            <a:r>
-              <a:rPr lang="en-US" dirty="0"/>
-              <a:t>Clicker Question 1</a:t>
-            </a:r>
-          </a:p>
-        </p:txBody>
-      </p:sp>
-      <p:sp>
-        <p:nvSpPr>
-          <p:cNvPr id="5" name="Text Placeholder 4">
-            <a:extLst>
-              <a:ext uri="{FF2B5EF4-FFF2-40B4-BE49-F238E27FC236}">
-                <a16:creationId xmlns:a16="http://schemas.microsoft.com/office/drawing/2014/main" id="{9B8EE924-1595-BC46-81AD-0D8DDAEDC371}"/>
-              </a:ext>
-            </a:extLst>
-          </p:cNvPr>
-          <p:cNvSpPr>
-            <a:spLocks noGrp="1"/>
-          </p:cNvSpPr>
-          <p:nvPr>
-            <p:ph type="body" idx="1"/>
-          </p:nvPr>
-        </p:nvSpPr>
-        <p:spPr/>
-        <p:txBody>
-          <a:bodyPr/>
-          <a:lstStyle/>
-          <a:p>
-            <a:endParaRPr lang="en-US"/>
-          </a:p>
-        </p:txBody>
-      </p:sp>
-    </p:spTree>
-    <p:extLst>
-      <p:ext uri="{BB962C8B-B14F-4D97-AF65-F5344CB8AC3E}">
-        <p14:creationId xmlns:p14="http://schemas.microsoft.com/office/powerpoint/2010/main" val="4294053067"/>
-      </p:ext>
-    </p:extLst>
-  </p:cSld>
-  <p:clrMapOvr>
-    <a:masterClrMapping/>
-  </p:clrMapOvr>
-</p:sld>
-</file>
-
-<file path=ppt/slides/slide20.xml><?xml version="1.0" encoding="utf-8"?>
-<p:sld xmlns:a="http://schemas.openxmlformats.org/drawingml/2006/main" xmlns:r="http://schemas.openxmlformats.org/officeDocument/2006/relationships" xmlns:p="http://schemas.openxmlformats.org/presentationml/2006/main">
-  <p:cSld>
-    <p:spTree>
-      <p:nvGrpSpPr>
-        <p:cNvPr id="1" name=""/>
-        <p:cNvGrpSpPr/>
-        <p:nvPr/>
-      </p:nvGrpSpPr>
-      <p:grpSpPr>
-        <a:xfrm>
-          <a:off x="0" y="0"/>
-          <a:ext cx="0" cy="0"/>
-          <a:chOff x="0" y="0"/>
-          <a:chExt cx="0" cy="0"/>
-        </a:xfrm>
-      </p:grpSpPr>
-      <p:sp>
-        <p:nvSpPr>
-          <p:cNvPr id="4" name="TextBox 3">
-            <a:extLst>
-              <a:ext uri="{FF2B5EF4-FFF2-40B4-BE49-F238E27FC236}">
-                <a16:creationId xmlns:a16="http://schemas.microsoft.com/office/drawing/2014/main" id="{A4DC20A2-3E30-B146-9865-597792CEE8C3}"/>
-              </a:ext>
-            </a:extLst>
-          </p:cNvPr>
-          <p:cNvSpPr txBox="1"/>
-          <p:nvPr/>
-        </p:nvSpPr>
-        <p:spPr>
-          <a:xfrm>
-            <a:off x="637309" y="1856507"/>
-            <a:ext cx="7980217" cy="3908762"/>
-          </a:xfrm>
-          <a:prstGeom prst="rect">
-            <a:avLst/>
-          </a:prstGeom>
-          <a:noFill/>
-        </p:spPr>
-        <p:txBody>
-          <a:bodyPr wrap="square" rtlCol="0">
-            <a:spAutoFit/>
-          </a:bodyPr>
-          <a:lstStyle/>
-          <a:p>
-            <a:pPr algn="ctr"/>
-            <a:r>
-              <a:rPr lang="en-US" sz="7200" dirty="0">
-                <a:solidFill>
-                  <a:schemeClr val="accent1"/>
-                </a:solidFill>
-                <a:latin typeface="CronosPro-Regular"/>
-                <a:cs typeface="CronosPro-Regular"/>
-              </a:rPr>
-              <a:t>Abstraction function</a:t>
-            </a:r>
-          </a:p>
-          <a:p>
-            <a:pPr algn="ctr"/>
-            <a:r>
-              <a:rPr lang="en-US" sz="4400" dirty="0">
-                <a:latin typeface="CronosPro-Regular"/>
-                <a:cs typeface="CronosPro-Regular"/>
-              </a:rPr>
-              <a:t>maps </a:t>
-            </a:r>
-          </a:p>
-          <a:p>
-            <a:pPr algn="ctr"/>
-            <a:r>
-              <a:rPr lang="en-US" sz="4400" dirty="0">
-                <a:latin typeface="CronosPro-Regular"/>
-                <a:cs typeface="CronosPro-Regular"/>
-              </a:rPr>
-              <a:t>valid </a:t>
-            </a:r>
-            <a:r>
-              <a:rPr lang="en-US" sz="4400" dirty="0">
-                <a:solidFill>
-                  <a:schemeClr val="accent3">
-                    <a:lumMod val="60000"/>
-                    <a:lumOff val="40000"/>
-                  </a:schemeClr>
-                </a:solidFill>
-                <a:latin typeface="CronosPro-Regular"/>
-                <a:cs typeface="CronosPro-Regular"/>
-              </a:rPr>
-              <a:t>concrete values</a:t>
-            </a:r>
-          </a:p>
-          <a:p>
-            <a:pPr algn="ctr"/>
-            <a:r>
-              <a:rPr lang="en-US" sz="4400" dirty="0">
-                <a:latin typeface="CronosPro-Regular"/>
-                <a:cs typeface="CronosPro-Regular"/>
-              </a:rPr>
-              <a:t> to </a:t>
-            </a:r>
-          </a:p>
-          <a:p>
-            <a:pPr algn="ctr"/>
-            <a:r>
-              <a:rPr lang="en-US" sz="4400" dirty="0">
-                <a:solidFill>
-                  <a:srgbClr val="4A7EBB"/>
-                </a:solidFill>
-                <a:latin typeface="CronosPro-Regular"/>
-                <a:cs typeface="CronosPro-Regular"/>
-              </a:rPr>
-              <a:t>abstract values</a:t>
-            </a:r>
-          </a:p>
-        </p:txBody>
-      </p:sp>
-    </p:spTree>
-    <p:extLst>
-      <p:ext uri="{BB962C8B-B14F-4D97-AF65-F5344CB8AC3E}">
-        <p14:creationId xmlns:p14="http://schemas.microsoft.com/office/powerpoint/2010/main" val="1828371675"/>
-      </p:ext>
-    </p:extLst>
-  </p:cSld>
-  <p:clrMapOvr>
-    <a:masterClrMapping/>
-  </p:clrMapOvr>
-</p:sld>
-</file>
-
 <file path=ppt/slides/slide21.xml><?xml version="1.0" encoding="utf-8"?>
 <p:sld xmlns:a="http://schemas.openxmlformats.org/drawingml/2006/main" xmlns:r="http://schemas.openxmlformats.org/officeDocument/2006/relationships" xmlns:p="http://schemas.openxmlformats.org/presentationml/2006/main">
   <p:cSld>
@@ -8306,98 +8447,10 @@
       </p:grpSpPr>
       <p:sp>
         <p:nvSpPr>
-          <p:cNvPr id="2" name="Title 1"/>
-          <p:cNvSpPr>
-            <a:spLocks noGrp="1"/>
-          </p:cNvSpPr>
-          <p:nvPr>
-            <p:ph type="title"/>
-          </p:nvPr>
-        </p:nvSpPr>
-        <p:spPr/>
-        <p:txBody>
-          <a:bodyPr>
-            <a:normAutofit/>
-          </a:bodyPr>
-          <a:lstStyle/>
-          <a:p>
-            <a:r>
-              <a:rPr lang="en-US" dirty="0"/>
-              <a:t>Documenting the AF</a:t>
-            </a:r>
-          </a:p>
-        </p:txBody>
-      </p:sp>
-      <p:sp>
-        <p:nvSpPr>
-          <p:cNvPr id="3" name="Content Placeholder 2"/>
-          <p:cNvSpPr>
-            <a:spLocks noGrp="1"/>
-          </p:cNvSpPr>
-          <p:nvPr>
-            <p:ph idx="1"/>
-          </p:nvPr>
-        </p:nvSpPr>
-        <p:spPr/>
-        <p:txBody>
-          <a:bodyPr>
-            <a:normAutofit/>
-          </a:bodyPr>
-          <a:lstStyle/>
-          <a:p>
-            <a:r>
-              <a:rPr lang="en-US" dirty="0"/>
-              <a:t>Above rep type in implementation you write:</a:t>
-            </a:r>
-          </a:p>
-          <a:p>
-            <a:pPr marL="457200" lvl="1" indent="0">
-              <a:buNone/>
-            </a:pPr>
-            <a:r>
-              <a:rPr lang="en-US" b="1" dirty="0">
-                <a:latin typeface="Courier"/>
-                <a:cs typeface="Courier"/>
-              </a:rPr>
-              <a:t>(* AF: </a:t>
-            </a:r>
-            <a:r>
-              <a:rPr lang="en-US" b="1" i="1" dirty="0">
-                <a:latin typeface="Courier"/>
-                <a:cs typeface="Courier"/>
-              </a:rPr>
-              <a:t>comment *)</a:t>
-            </a:r>
-          </a:p>
-          <a:p>
-            <a:endParaRPr lang="en-US" dirty="0"/>
-          </a:p>
-          <a:p>
-            <a:r>
-              <a:rPr lang="en-US" dirty="0"/>
-              <a:t>Write it </a:t>
-            </a:r>
-            <a:r>
-              <a:rPr lang="en-US" dirty="0">
-                <a:solidFill>
-                  <a:schemeClr val="accent1"/>
-                </a:solidFill>
-              </a:rPr>
-              <a:t>first</a:t>
-            </a:r>
-            <a:r>
-              <a:rPr lang="en-US" dirty="0"/>
-              <a:t> before implementing operations</a:t>
-            </a:r>
-          </a:p>
-        </p:txBody>
-      </p:sp>
-      <p:sp>
-        <p:nvSpPr>
           <p:cNvPr id="4" name="TextBox 3">
             <a:extLst>
               <a:ext uri="{FF2B5EF4-FFF2-40B4-BE49-F238E27FC236}">
-                <a16:creationId xmlns:a16="http://schemas.microsoft.com/office/drawing/2014/main" id="{84353C5A-8CA6-F944-B36C-247C42C9A2D4}"/>
+                <a16:creationId xmlns:a16="http://schemas.microsoft.com/office/drawing/2014/main" id="{A4DC20A2-3E30-B146-9865-597792CEE8C3}"/>
               </a:ext>
             </a:extLst>
           </p:cNvPr>
@@ -8406,8 +8459,8 @@
         </p:nvSpPr>
         <p:spPr>
           <a:xfrm>
-            <a:off x="7820832" y="6094812"/>
-            <a:ext cx="914033" cy="461665"/>
+            <a:off x="637309" y="1856507"/>
+            <a:ext cx="7980217" cy="3908762"/>
           </a:xfrm>
           <a:prstGeom prst="rect">
             <a:avLst/>
@@ -8420,16 +8473,72 @@
           </a:bodyPr>
           <a:lstStyle/>
           <a:p>
-            <a:r>
-              <a:rPr lang="en-US" sz="2400" dirty="0">
+            <a:pPr algn="ctr"/>
+            <a:r>
+              <a:rPr lang="en-US" sz="7200" dirty="0">
                 <a:solidFill>
-                  <a:schemeClr val="bg2">
-                    <a:lumMod val="50000"/>
+                  <a:schemeClr val="accent1"/>
+                </a:solidFill>
+                <a:latin typeface="CronosPro-Regular"/>
+                <a:cs typeface="CronosPro-Regular"/>
+              </a:rPr>
+              <a:t>Abstraction function</a:t>
+            </a:r>
+          </a:p>
+          <a:p>
+            <a:pPr algn="ctr"/>
+            <a:r>
+              <a:rPr lang="en-US" sz="4400" dirty="0">
+                <a:latin typeface="CronosPro-Regular"/>
+                <a:cs typeface="CronosPro-Regular"/>
+              </a:rPr>
+              <a:t>maps </a:t>
+            </a:r>
+          </a:p>
+          <a:p>
+            <a:pPr algn="ctr"/>
+            <a:r>
+              <a:rPr lang="en-US" sz="4400" dirty="0">
+                <a:latin typeface="CronosPro-Regular"/>
+                <a:cs typeface="CronosPro-Regular"/>
+              </a:rPr>
+              <a:t>valid </a:t>
+            </a:r>
+            <a:r>
+              <a:rPr lang="en-US" sz="4400" dirty="0">
+                <a:solidFill>
+                  <a:schemeClr val="accent3">
+                    <a:lumMod val="60000"/>
+                    <a:lumOff val="40000"/>
                   </a:schemeClr>
                 </a:solidFill>
-                <a:latin typeface="Cronos Pro" panose="020C0502030403020304" pitchFamily="34" charset="77"/>
+                <a:latin typeface="CronosPro-Regular"/>
+                <a:cs typeface="CronosPro-Regular"/>
               </a:rPr>
-              <a:t>Demo</a:t>
+              <a:t>concrete values</a:t>
+            </a:r>
+          </a:p>
+          <a:p>
+            <a:pPr algn="ctr"/>
+            <a:r>
+              <a:rPr lang="en-US" sz="4400" dirty="0">
+                <a:latin typeface="CronosPro-Regular"/>
+                <a:cs typeface="CronosPro-Regular"/>
+              </a:rPr>
+              <a:t> to </a:t>
+            </a:r>
+          </a:p>
+          <a:p>
+            <a:pPr algn="ctr"/>
+            <a:r>
+              <a:rPr lang="en-US" sz="4400" dirty="0">
+                <a:solidFill>
+                  <a:srgbClr val="4A7EBB"/>
+                </a:solidFill>
+                <a:latin typeface="CronosPro-Regular"/>
+                <a:cs typeface="CronosPro-Regular"/>
+              </a:rPr>
+              <a:t>abstract values</a:t>
             </a:r>
           </a:p>
         </p:txBody>
@@ -8437,7 +8546,7 @@
     </p:spTree>
     <p:extLst>
       <p:ext uri="{BB962C8B-B14F-4D97-AF65-F5344CB8AC3E}">
-        <p14:creationId xmlns:p14="http://schemas.microsoft.com/office/powerpoint/2010/main" val="1317471447"/>
+        <p14:creationId xmlns:p14="http://schemas.microsoft.com/office/powerpoint/2010/main" val="1828371675"/>
       </p:ext>
     </p:extLst>
   </p:cSld>
@@ -8483,7 +8592,7 @@
           <a:p>
             <a:r>
               <a:rPr lang="en-US" dirty="0"/>
-              <a:t>Implementing the AF</a:t>
+              <a:t>Documenting the AF</a:t>
             </a:r>
           </a:p>
         </p:txBody>
@@ -8507,42 +8616,89 @@
           <a:p>
             <a:r>
               <a:rPr lang="en-US" dirty="0"/>
-              <a:t>You don’t</a:t>
-            </a:r>
-          </a:p>
-          <a:p>
-            <a:pPr lvl="1"/>
+              <a:t>Above rep type in implementation you write:</a:t>
+            </a:r>
+          </a:p>
+          <a:p>
+            <a:pPr marL="457200" lvl="1" indent="0">
+              <a:buNone/>
+            </a:pPr>
+            <a:r>
+              <a:rPr lang="en-US" b="1" dirty="0">
+                <a:latin typeface="Courier"/>
+                <a:cs typeface="Courier"/>
+              </a:rPr>
+              <a:t>(* AF: </a:t>
+            </a:r>
+            <a:r>
+              <a:rPr lang="en-US" b="1" i="1" dirty="0">
+                <a:latin typeface="Courier"/>
+                <a:cs typeface="Courier"/>
+              </a:rPr>
+              <a:t>comment *)</a:t>
+            </a:r>
+          </a:p>
+          <a:p>
+            <a:endParaRPr lang="en-US" dirty="0"/>
+          </a:p>
+          <a:p>
             <a:r>
               <a:rPr lang="en-US" dirty="0"/>
-              <a:t>Abstract values are a mathematical idea not a programming reality</a:t>
-            </a:r>
-          </a:p>
-          <a:p>
-            <a:pPr lvl="1"/>
+              <a:t>Write it </a:t>
+            </a:r>
+            <a:r>
+              <a:rPr lang="en-US" dirty="0">
+                <a:solidFill>
+                  <a:schemeClr val="accent1"/>
+                </a:solidFill>
+              </a:rPr>
+              <a:t>first</a:t>
+            </a:r>
             <a:r>
               <a:rPr lang="en-US" dirty="0"/>
-              <a:t>Would need to have an </a:t>
-            </a:r>
-            <a:r>
-              <a:rPr lang="en-US" dirty="0" err="1"/>
-              <a:t>OCaml</a:t>
-            </a:r>
-            <a:r>
-              <a:rPr lang="en-US" dirty="0"/>
-              <a:t> type for abstract values</a:t>
-            </a:r>
-          </a:p>
-          <a:p>
-            <a:pPr lvl="1"/>
-            <a:r>
-              <a:rPr lang="en-US" dirty="0"/>
-              <a:t>If you had that type, you wouldn’t need whatever data abstraction you’re working on</a:t>
-            </a:r>
-          </a:p>
-          <a:p>
-            <a:r>
-              <a:rPr lang="en-US" dirty="0"/>
-              <a:t>But conversion to strings comes close</a:t>
+              <a:t> before implementing operations</a:t>
+            </a:r>
+          </a:p>
+        </p:txBody>
+      </p:sp>
+      <p:sp>
+        <p:nvSpPr>
+          <p:cNvPr id="4" name="TextBox 3">
+            <a:extLst>
+              <a:ext uri="{FF2B5EF4-FFF2-40B4-BE49-F238E27FC236}">
+                <a16:creationId xmlns:a16="http://schemas.microsoft.com/office/drawing/2014/main" id="{84353C5A-8CA6-F944-B36C-247C42C9A2D4}"/>
+              </a:ext>
+            </a:extLst>
+          </p:cNvPr>
+          <p:cNvSpPr txBox="1"/>
+          <p:nvPr/>
+        </p:nvSpPr>
+        <p:spPr>
+          <a:xfrm>
+            <a:off x="7820832" y="6094812"/>
+            <a:ext cx="914033" cy="461665"/>
+          </a:xfrm>
+          <a:prstGeom prst="rect">
+            <a:avLst/>
+          </a:prstGeom>
+          <a:noFill/>
+        </p:spPr>
+        <p:txBody>
+          <a:bodyPr wrap="square" rtlCol="0">
+            <a:spAutoFit/>
+          </a:bodyPr>
+          <a:lstStyle/>
+          <a:p>
+            <a:r>
+              <a:rPr lang="en-US" sz="2400" dirty="0">
+                <a:solidFill>
+                  <a:schemeClr val="bg2">
+                    <a:lumMod val="50000"/>
+                  </a:schemeClr>
+                </a:solidFill>
+                <a:latin typeface="Cronos Pro" panose="020C0502030403020304" pitchFamily="34" charset="77"/>
+              </a:rPr>
+              <a:t>Demo</a:t>
             </a:r>
           </a:p>
         </p:txBody>
@@ -8550,7 +8706,7 @@
     </p:spTree>
     <p:extLst>
       <p:ext uri="{BB962C8B-B14F-4D97-AF65-F5344CB8AC3E}">
-        <p14:creationId xmlns:p14="http://schemas.microsoft.com/office/powerpoint/2010/main" val="38725512"/>
+        <p14:creationId xmlns:p14="http://schemas.microsoft.com/office/powerpoint/2010/main" val="1317471447"/>
       </p:ext>
     </p:extLst>
   </p:cSld>
@@ -8596,7 +8752,7 @@
           <a:p>
             <a:r>
               <a:rPr lang="en-US" dirty="0"/>
-              <a:t>Representation types</a:t>
+              <a:t>Implementing the AF</a:t>
             </a:r>
           </a:p>
         </p:txBody>
@@ -8613,89 +8769,49 @@
         </p:nvSpPr>
         <p:spPr/>
         <p:txBody>
-          <a:bodyPr/>
-          <a:lstStyle/>
-          <a:p>
-            <a:r>
-              <a:rPr lang="en-US" b="1" dirty="0"/>
-              <a:t>Q:</a:t>
-            </a:r>
+          <a:bodyPr>
+            <a:normAutofit/>
+          </a:bodyPr>
+          <a:lstStyle/>
+          <a:p>
             <a:r>
               <a:rPr lang="en-US" dirty="0"/>
-              <a:t>  How to </a:t>
-            </a:r>
-            <a:r>
-              <a:rPr lang="en-US" dirty="0">
-                <a:solidFill>
-                  <a:schemeClr val="accent1"/>
-                </a:solidFill>
-              </a:rPr>
-              <a:t>interpret</a:t>
-            </a:r>
+              <a:t>You don’t</a:t>
+            </a:r>
+          </a:p>
+          <a:p>
+            <a:pPr lvl="1"/>
             <a:r>
               <a:rPr lang="en-US" dirty="0"/>
-              <a:t> the representation type as the data abstraction?</a:t>
-            </a:r>
-          </a:p>
-          <a:p>
-            <a:r>
-              <a:rPr lang="en-US" b="1" dirty="0">
-                <a:solidFill>
-                  <a:schemeClr val="accent2"/>
-                </a:solidFill>
-              </a:rPr>
-              <a:t>A:</a:t>
-            </a:r>
-            <a:r>
-              <a:rPr lang="en-US" dirty="0">
-                <a:solidFill>
-                  <a:schemeClr val="accent2"/>
-                </a:solidFill>
-              </a:rPr>
-              <a:t>  Abstraction function</a:t>
-            </a:r>
-          </a:p>
-          <a:p>
-            <a:endParaRPr lang="en-US" dirty="0"/>
-          </a:p>
-          <a:p>
-            <a:r>
-              <a:rPr lang="en-US" b="1" dirty="0"/>
-              <a:t>Q:</a:t>
-            </a:r>
+              <a:t>Abstract values are a mathematical idea not a programming reality</a:t>
+            </a:r>
+          </a:p>
+          <a:p>
+            <a:pPr lvl="1"/>
             <a:r>
               <a:rPr lang="en-US" dirty="0"/>
-              <a:t>  How to determine which values of representation type are </a:t>
-            </a:r>
-            <a:r>
-              <a:rPr lang="en-US" dirty="0">
-                <a:solidFill>
-                  <a:schemeClr val="accent1"/>
-                </a:solidFill>
-              </a:rPr>
-              <a:t>meaningful</a:t>
+              <a:t>Would need to have an </a:t>
+            </a:r>
+            <a:r>
+              <a:rPr lang="en-US" dirty="0" err="1"/>
+              <a:t>OCaml</a:t>
             </a:r>
             <a:r>
               <a:rPr lang="en-US" dirty="0"/>
-              <a:t>?</a:t>
-            </a:r>
-          </a:p>
-          <a:p>
-            <a:r>
-              <a:rPr lang="en-US" b="1" dirty="0">
-                <a:solidFill>
-                  <a:srgbClr val="C0504D"/>
-                </a:solidFill>
-              </a:rPr>
-              <a:t>A:</a:t>
-            </a:r>
-            <a:r>
-              <a:rPr lang="en-US" dirty="0">
-                <a:solidFill>
-                  <a:srgbClr val="C0504D"/>
-                </a:solidFill>
-              </a:rPr>
-              <a:t>  Representation invariant</a:t>
+              <a:t> type for abstract values</a:t>
+            </a:r>
+          </a:p>
+          <a:p>
+            <a:pPr lvl="1"/>
+            <a:r>
+              <a:rPr lang="en-US" dirty="0"/>
+              <a:t>If you had that type, you wouldn’t need whatever data abstraction you’re working on</a:t>
+            </a:r>
+          </a:p>
+          <a:p>
+            <a:r>
+              <a:rPr lang="en-US" dirty="0"/>
+              <a:t>But conversion to strings comes close</a:t>
             </a:r>
           </a:p>
         </p:txBody>
@@ -8703,7 +8819,7 @@
     </p:spTree>
     <p:extLst>
       <p:ext uri="{BB962C8B-B14F-4D97-AF65-F5344CB8AC3E}">
-        <p14:creationId xmlns:p14="http://schemas.microsoft.com/office/powerpoint/2010/main" val="889750310"/>
+        <p14:creationId xmlns:p14="http://schemas.microsoft.com/office/powerpoint/2010/main" val="38725512"/>
       </p:ext>
     </p:extLst>
   </p:cSld>
@@ -8732,6 +8848,159 @@
       </p:grpSpPr>
       <p:sp>
         <p:nvSpPr>
+          <p:cNvPr id="2" name="Title 1"/>
+          <p:cNvSpPr>
+            <a:spLocks noGrp="1"/>
+          </p:cNvSpPr>
+          <p:nvPr>
+            <p:ph type="title"/>
+          </p:nvPr>
+        </p:nvSpPr>
+        <p:spPr/>
+        <p:txBody>
+          <a:bodyPr>
+            <a:normAutofit/>
+          </a:bodyPr>
+          <a:lstStyle/>
+          <a:p>
+            <a:r>
+              <a:rPr lang="en-US" dirty="0"/>
+              <a:t>Representation types</a:t>
+            </a:r>
+          </a:p>
+        </p:txBody>
+      </p:sp>
+      <p:sp>
+        <p:nvSpPr>
+          <p:cNvPr id="3" name="Content Placeholder 2"/>
+          <p:cNvSpPr>
+            <a:spLocks noGrp="1"/>
+          </p:cNvSpPr>
+          <p:nvPr>
+            <p:ph idx="1"/>
+          </p:nvPr>
+        </p:nvSpPr>
+        <p:spPr/>
+        <p:txBody>
+          <a:bodyPr/>
+          <a:lstStyle/>
+          <a:p>
+            <a:r>
+              <a:rPr lang="en-US" b="1" dirty="0"/>
+              <a:t>Q:</a:t>
+            </a:r>
+            <a:r>
+              <a:rPr lang="en-US" dirty="0"/>
+              <a:t>  How to </a:t>
+            </a:r>
+            <a:r>
+              <a:rPr lang="en-US" dirty="0">
+                <a:solidFill>
+                  <a:schemeClr val="accent1"/>
+                </a:solidFill>
+              </a:rPr>
+              <a:t>interpret</a:t>
+            </a:r>
+            <a:r>
+              <a:rPr lang="en-US" dirty="0"/>
+              <a:t> the representation type as the data abstraction?</a:t>
+            </a:r>
+          </a:p>
+          <a:p>
+            <a:r>
+              <a:rPr lang="en-US" b="1" dirty="0">
+                <a:solidFill>
+                  <a:schemeClr val="accent2"/>
+                </a:solidFill>
+              </a:rPr>
+              <a:t>A:</a:t>
+            </a:r>
+            <a:r>
+              <a:rPr lang="en-US" dirty="0">
+                <a:solidFill>
+                  <a:schemeClr val="accent2"/>
+                </a:solidFill>
+              </a:rPr>
+              <a:t>  Abstraction function</a:t>
+            </a:r>
+          </a:p>
+          <a:p>
+            <a:endParaRPr lang="en-US" dirty="0"/>
+          </a:p>
+          <a:p>
+            <a:r>
+              <a:rPr lang="en-US" b="1" dirty="0"/>
+              <a:t>Q:</a:t>
+            </a:r>
+            <a:r>
+              <a:rPr lang="en-US" dirty="0"/>
+              <a:t>  How to determine which values of representation type are </a:t>
+            </a:r>
+            <a:r>
+              <a:rPr lang="en-US" dirty="0">
+                <a:solidFill>
+                  <a:schemeClr val="accent1"/>
+                </a:solidFill>
+              </a:rPr>
+              <a:t>meaningful</a:t>
+            </a:r>
+            <a:r>
+              <a:rPr lang="en-US" dirty="0"/>
+              <a:t>?</a:t>
+            </a:r>
+          </a:p>
+          <a:p>
+            <a:r>
+              <a:rPr lang="en-US" b="1" dirty="0">
+                <a:solidFill>
+                  <a:srgbClr val="C0504D"/>
+                </a:solidFill>
+              </a:rPr>
+              <a:t>A:</a:t>
+            </a:r>
+            <a:r>
+              <a:rPr lang="en-US" dirty="0">
+                <a:solidFill>
+                  <a:srgbClr val="C0504D"/>
+                </a:solidFill>
+              </a:rPr>
+              <a:t>  Representation invariant</a:t>
+            </a:r>
+          </a:p>
+        </p:txBody>
+      </p:sp>
+    </p:spTree>
+    <p:extLst>
+      <p:ext uri="{BB962C8B-B14F-4D97-AF65-F5344CB8AC3E}">
+        <p14:creationId xmlns:p14="http://schemas.microsoft.com/office/powerpoint/2010/main" val="889750310"/>
+      </p:ext>
+    </p:extLst>
+  </p:cSld>
+  <p:clrMapOvr>
+    <a:masterClrMapping/>
+  </p:clrMapOvr>
+</p:sld>
+</file>
+
+<file path=ppt/slides/slide25.xml><?xml version="1.0" encoding="utf-8"?>
+<p:sld xmlns:a="http://schemas.openxmlformats.org/drawingml/2006/main" xmlns:r="http://schemas.openxmlformats.org/officeDocument/2006/relationships" xmlns:p="http://schemas.openxmlformats.org/presentationml/2006/main">
+  <p:cSld>
+    <p:spTree>
+      <p:nvGrpSpPr>
+        <p:cNvPr id="1" name=""/>
+        <p:cNvGrpSpPr/>
+        <p:nvPr/>
+      </p:nvGrpSpPr>
+      <p:grpSpPr>
+        <a:xfrm>
+          <a:off x="0" y="0"/>
+          <a:ext cx="0" cy="0"/>
+          <a:chOff x="0" y="0"/>
+          <a:chExt cx="0" cy="0"/>
+        </a:xfrm>
+      </p:grpSpPr>
+      <p:sp>
+        <p:nvSpPr>
           <p:cNvPr id="4" name="Title 3">
             <a:extLst>
               <a:ext uri="{FF2B5EF4-FFF2-40B4-BE49-F238E27FC236}">
@@ -8796,7 +9065,7 @@
 </p:sld>
 </file>
 
-<file path=ppt/slides/slide25.xml><?xml version="1.0" encoding="utf-8"?>
+<file path=ppt/slides/slide26.xml><?xml version="1.0" encoding="utf-8"?>
 <p:sld xmlns:a="http://schemas.openxmlformats.org/drawingml/2006/main" xmlns:r="http://schemas.openxmlformats.org/officeDocument/2006/relationships" xmlns:p="http://schemas.openxmlformats.org/presentationml/2006/main">
   <p:cSld>
     <p:spTree>
@@ -9513,7 +9782,7 @@
 </p:sld>
 </file>
 
-<file path=ppt/slides/slide26.xml><?xml version="1.0" encoding="utf-8"?>
+<file path=ppt/slides/slide27.xml><?xml version="1.0" encoding="utf-8"?>
 <p:sld xmlns:a="http://schemas.openxmlformats.org/drawingml/2006/main" xmlns:r="http://schemas.openxmlformats.org/officeDocument/2006/relationships" xmlns:p="http://schemas.openxmlformats.org/presentationml/2006/main">
   <p:cSld>
     <p:spTree>
@@ -10580,151 +10849,6 @@
 </p:sld>
 </file>
 
-<file path=ppt/slides/slide27.xml><?xml version="1.0" encoding="utf-8"?>
-<p:sld xmlns:a="http://schemas.openxmlformats.org/drawingml/2006/main" xmlns:r="http://schemas.openxmlformats.org/officeDocument/2006/relationships" xmlns:p="http://schemas.openxmlformats.org/presentationml/2006/main">
-  <p:cSld>
-    <p:spTree>
-      <p:nvGrpSpPr>
-        <p:cNvPr id="1" name=""/>
-        <p:cNvGrpSpPr/>
-        <p:nvPr/>
-      </p:nvGrpSpPr>
-      <p:grpSpPr>
-        <a:xfrm>
-          <a:off x="0" y="0"/>
-          <a:ext cx="0" cy="0"/>
-          <a:chOff x="0" y="0"/>
-          <a:chExt cx="0" cy="0"/>
-        </a:xfrm>
-      </p:grpSpPr>
-      <p:sp>
-        <p:nvSpPr>
-          <p:cNvPr id="4" name="TextBox 3">
-            <a:extLst>
-              <a:ext uri="{FF2B5EF4-FFF2-40B4-BE49-F238E27FC236}">
-                <a16:creationId xmlns:a16="http://schemas.microsoft.com/office/drawing/2014/main" id="{A4DC20A2-3E30-B146-9865-597792CEE8C3}"/>
-              </a:ext>
-            </a:extLst>
-          </p:cNvPr>
-          <p:cNvSpPr txBox="1"/>
-          <p:nvPr/>
-        </p:nvSpPr>
-        <p:spPr>
-          <a:xfrm>
-            <a:off x="637309" y="1856507"/>
-            <a:ext cx="7980217" cy="4585871"/>
-          </a:xfrm>
-          <a:prstGeom prst="rect">
-            <a:avLst/>
-          </a:prstGeom>
-          <a:noFill/>
-        </p:spPr>
-        <p:txBody>
-          <a:bodyPr wrap="square" rtlCol="0">
-            <a:spAutoFit/>
-          </a:bodyPr>
-          <a:lstStyle/>
-          <a:p>
-            <a:pPr algn="ctr"/>
-            <a:r>
-              <a:rPr lang="en-US" sz="7200" dirty="0">
-                <a:solidFill>
-                  <a:schemeClr val="accent1"/>
-                </a:solidFill>
-                <a:latin typeface="CronosPro-Regular"/>
-                <a:cs typeface="CronosPro-Regular"/>
-              </a:rPr>
-              <a:t>Rep. invariant</a:t>
-            </a:r>
-          </a:p>
-          <a:p>
-            <a:pPr algn="ctr"/>
-            <a:r>
-              <a:rPr lang="en-US" sz="4400" dirty="0">
-                <a:latin typeface="CronosPro-Regular"/>
-                <a:cs typeface="CronosPro-Regular"/>
-              </a:rPr>
-              <a:t>distinguishes </a:t>
-            </a:r>
-          </a:p>
-          <a:p>
-            <a:pPr algn="ctr"/>
-            <a:r>
-              <a:rPr lang="en-US" sz="4400" dirty="0">
-                <a:latin typeface="CronosPro-Regular"/>
-                <a:cs typeface="CronosPro-Regular"/>
-              </a:rPr>
-              <a:t>valid </a:t>
-            </a:r>
-            <a:r>
-              <a:rPr lang="en-US" sz="4400" dirty="0">
-                <a:solidFill>
-                  <a:schemeClr val="accent3">
-                    <a:lumMod val="60000"/>
-                    <a:lumOff val="40000"/>
-                  </a:schemeClr>
-                </a:solidFill>
-                <a:latin typeface="CronosPro-Regular"/>
-                <a:cs typeface="CronosPro-Regular"/>
-              </a:rPr>
-              <a:t>concrete values</a:t>
-            </a:r>
-          </a:p>
-          <a:p>
-            <a:pPr algn="ctr"/>
-            <a:r>
-              <a:rPr lang="en-US" sz="4400" dirty="0">
-                <a:latin typeface="CronosPro-Regular"/>
-                <a:cs typeface="CronosPro-Regular"/>
-              </a:rPr>
-              <a:t> from </a:t>
-            </a:r>
-          </a:p>
-          <a:p>
-            <a:pPr algn="ctr"/>
-            <a:r>
-              <a:rPr lang="en-US" sz="4400" dirty="0">
-                <a:latin typeface="CronosPro-Regular"/>
-                <a:cs typeface="CronosPro-Regular"/>
-              </a:rPr>
-              <a:t>invalid </a:t>
-            </a:r>
-            <a:r>
-              <a:rPr lang="en-US" sz="4400" dirty="0">
-                <a:solidFill>
-                  <a:schemeClr val="accent3">
-                    <a:lumMod val="60000"/>
-                    <a:lumOff val="40000"/>
-                  </a:schemeClr>
-                </a:solidFill>
-                <a:latin typeface="CronosPro-Regular"/>
-                <a:cs typeface="CronosPro-Regular"/>
-              </a:rPr>
-              <a:t>concrete values</a:t>
-            </a:r>
-          </a:p>
-          <a:p>
-            <a:pPr algn="ctr"/>
-            <a:endParaRPr lang="en-US" sz="4400" dirty="0">
-              <a:latin typeface="CronosPro-Regular"/>
-              <a:cs typeface="CronosPro-Regular"/>
-            </a:endParaRPr>
-          </a:p>
-        </p:txBody>
-      </p:sp>
-    </p:spTree>
-    <p:extLst>
-      <p:ext uri="{BB962C8B-B14F-4D97-AF65-F5344CB8AC3E}">
-        <p14:creationId xmlns:p14="http://schemas.microsoft.com/office/powerpoint/2010/main" val="2484069664"/>
-      </p:ext>
-    </p:extLst>
-  </p:cSld>
-  <p:clrMapOvr>
-    <a:masterClrMapping/>
-  </p:clrMapOvr>
-</p:sld>
-</file>
-
 <file path=ppt/slides/slide28.xml><?xml version="1.0" encoding="utf-8"?>
 <p:sld xmlns:a="http://schemas.openxmlformats.org/drawingml/2006/main" xmlns:r="http://schemas.openxmlformats.org/officeDocument/2006/relationships" xmlns:p="http://schemas.openxmlformats.org/presentationml/2006/main">
   <p:cSld>
@@ -10744,98 +10868,10 @@
       </p:grpSpPr>
       <p:sp>
         <p:nvSpPr>
-          <p:cNvPr id="2" name="Title 1"/>
-          <p:cNvSpPr>
-            <a:spLocks noGrp="1"/>
-          </p:cNvSpPr>
-          <p:nvPr>
-            <p:ph type="title"/>
-          </p:nvPr>
-        </p:nvSpPr>
-        <p:spPr/>
-        <p:txBody>
-          <a:bodyPr>
-            <a:normAutofit/>
-          </a:bodyPr>
-          <a:lstStyle/>
-          <a:p>
-            <a:r>
-              <a:rPr lang="en-US" dirty="0"/>
-              <a:t>Documenting the RI</a:t>
-            </a:r>
-          </a:p>
-        </p:txBody>
-      </p:sp>
-      <p:sp>
-        <p:nvSpPr>
-          <p:cNvPr id="3" name="Content Placeholder 2"/>
-          <p:cNvSpPr>
-            <a:spLocks noGrp="1"/>
-          </p:cNvSpPr>
-          <p:nvPr>
-            <p:ph idx="1"/>
-          </p:nvPr>
-        </p:nvSpPr>
-        <p:spPr/>
-        <p:txBody>
-          <a:bodyPr>
-            <a:normAutofit/>
-          </a:bodyPr>
-          <a:lstStyle/>
-          <a:p>
-            <a:r>
-              <a:rPr lang="en-US" dirty="0"/>
-              <a:t>Above rep type in implementation you write:</a:t>
-            </a:r>
-          </a:p>
-          <a:p>
-            <a:pPr marL="457200" lvl="1" indent="0">
-              <a:buNone/>
-            </a:pPr>
-            <a:r>
-              <a:rPr lang="en-US" b="1" dirty="0">
-                <a:latin typeface="Courier"/>
-                <a:cs typeface="Courier"/>
-              </a:rPr>
-              <a:t>(* RI: </a:t>
-            </a:r>
-            <a:r>
-              <a:rPr lang="en-US" b="1" i="1" dirty="0">
-                <a:latin typeface="Courier"/>
-                <a:cs typeface="Courier"/>
-              </a:rPr>
-              <a:t>comment *)</a:t>
-            </a:r>
-          </a:p>
-          <a:p>
-            <a:endParaRPr lang="en-US" dirty="0"/>
-          </a:p>
-          <a:p>
-            <a:r>
-              <a:rPr lang="en-US" dirty="0"/>
-              <a:t>Write it </a:t>
-            </a:r>
-            <a:r>
-              <a:rPr lang="en-US" dirty="0">
-                <a:solidFill>
-                  <a:schemeClr val="accent1"/>
-                </a:solidFill>
-              </a:rPr>
-              <a:t>first</a:t>
-            </a:r>
-            <a:r>
-              <a:rPr lang="en-US" dirty="0"/>
-              <a:t> before implementing operations</a:t>
-            </a:r>
-          </a:p>
-        </p:txBody>
-      </p:sp>
-      <p:sp>
-        <p:nvSpPr>
           <p:cNvPr id="4" name="TextBox 3">
             <a:extLst>
               <a:ext uri="{FF2B5EF4-FFF2-40B4-BE49-F238E27FC236}">
-                <a16:creationId xmlns:a16="http://schemas.microsoft.com/office/drawing/2014/main" id="{93862FB4-F75B-8A4A-A1AD-F05025C75983}"/>
+                <a16:creationId xmlns:a16="http://schemas.microsoft.com/office/drawing/2014/main" id="{A4DC20A2-3E30-B146-9865-597792CEE8C3}"/>
               </a:ext>
             </a:extLst>
           </p:cNvPr>
@@ -10844,8 +10880,8 @@
         </p:nvSpPr>
         <p:spPr>
           <a:xfrm>
-            <a:off x="7820832" y="6094812"/>
-            <a:ext cx="914033" cy="461665"/>
+            <a:off x="637309" y="1856507"/>
+            <a:ext cx="7980217" cy="4585871"/>
           </a:xfrm>
           <a:prstGeom prst="rect">
             <a:avLst/>
@@ -10858,24 +10894,97 @@
           </a:bodyPr>
           <a:lstStyle/>
           <a:p>
-            <a:r>
-              <a:rPr lang="en-US" sz="2400" dirty="0">
+            <a:pPr algn="ctr"/>
+            <a:r>
+              <a:rPr lang="en-US" sz="7200" dirty="0">
                 <a:solidFill>
-                  <a:schemeClr val="bg2">
-                    <a:lumMod val="50000"/>
+                  <a:schemeClr val="accent1"/>
+                </a:solidFill>
+                <a:latin typeface="CronosPro-Regular"/>
+                <a:cs typeface="CronosPro-Regular"/>
+              </a:rPr>
+              <a:t>Rep. invariant</a:t>
+            </a:r>
+          </a:p>
+          <a:p>
+            <a:pPr algn="ctr"/>
+            <a:r>
+              <a:rPr lang="en-US" sz="4400" dirty="0">
+                <a:latin typeface="CronosPro-Regular"/>
+                <a:cs typeface="CronosPro-Regular"/>
+              </a:rPr>
+              <a:t>distinguishes </a:t>
+            </a:r>
+          </a:p>
+          <a:p>
+            <a:pPr algn="ctr"/>
+            <a:r>
+              <a:rPr lang="en-US" sz="4400" dirty="0">
+                <a:latin typeface="CronosPro-Regular"/>
+                <a:cs typeface="CronosPro-Regular"/>
+              </a:rPr>
+              <a:t>valid </a:t>
+            </a:r>
+            <a:r>
+              <a:rPr lang="en-US" sz="4400" dirty="0">
+                <a:solidFill>
+                  <a:schemeClr val="accent3">
+                    <a:lumMod val="60000"/>
+                    <a:lumOff val="40000"/>
                   </a:schemeClr>
                 </a:solidFill>
-                <a:latin typeface="Cronos Pro" panose="020C0502030403020304" pitchFamily="34" charset="77"/>
+                <a:latin typeface="CronosPro-Regular"/>
+                <a:cs typeface="CronosPro-Regular"/>
               </a:rPr>
-              <a:t>Demo</a:t>
-            </a:r>
+              <a:t>concrete values</a:t>
+            </a:r>
+          </a:p>
+          <a:p>
+            <a:pPr algn="ctr"/>
+            <a:r>
+              <a:rPr lang="en-US" sz="4400" dirty="0">
+                <a:latin typeface="CronosPro-Regular"/>
+                <a:cs typeface="CronosPro-Regular"/>
+              </a:rPr>
+              <a:t> from </a:t>
+            </a:r>
+          </a:p>
+          <a:p>
+            <a:pPr algn="ctr"/>
+            <a:r>
+              <a:rPr lang="en-US" sz="4400" dirty="0">
+                <a:latin typeface="CronosPro-Regular"/>
+                <a:cs typeface="CronosPro-Regular"/>
+              </a:rPr>
+              <a:t>invalid </a:t>
+            </a:r>
+            <a:r>
+              <a:rPr lang="en-US" sz="4400" dirty="0">
+                <a:solidFill>
+                  <a:schemeClr val="accent3">
+                    <a:lumMod val="60000"/>
+                    <a:lumOff val="40000"/>
+                  </a:schemeClr>
+                </a:solidFill>
+                <a:latin typeface="CronosPro-Regular"/>
+                <a:cs typeface="CronosPro-Regular"/>
+              </a:rPr>
+              <a:t>concrete values</a:t>
+            </a:r>
+          </a:p>
+          <a:p>
+            <a:pPr algn="ctr"/>
+            <a:endParaRPr lang="en-US" sz="4400" dirty="0">
+              <a:latin typeface="CronosPro-Regular"/>
+              <a:cs typeface="CronosPro-Regular"/>
+            </a:endParaRPr>
           </a:p>
         </p:txBody>
       </p:sp>
     </p:spTree>
     <p:extLst>
       <p:ext uri="{BB962C8B-B14F-4D97-AF65-F5344CB8AC3E}">
-        <p14:creationId xmlns:p14="http://schemas.microsoft.com/office/powerpoint/2010/main" val="514632663"/>
+        <p14:creationId xmlns:p14="http://schemas.microsoft.com/office/powerpoint/2010/main" val="2484069664"/>
       </p:ext>
     </p:extLst>
   </p:cSld>
@@ -10904,143 +11013,98 @@
       </p:grpSpPr>
       <p:sp>
         <p:nvSpPr>
+          <p:cNvPr id="2" name="Title 1"/>
+          <p:cNvSpPr>
+            <a:spLocks noGrp="1"/>
+          </p:cNvSpPr>
+          <p:nvPr>
+            <p:ph type="title"/>
+          </p:nvPr>
+        </p:nvSpPr>
+        <p:spPr/>
+        <p:txBody>
+          <a:bodyPr>
+            <a:normAutofit/>
+          </a:bodyPr>
+          <a:lstStyle/>
+          <a:p>
+            <a:r>
+              <a:rPr lang="en-US" dirty="0"/>
+              <a:t>Documenting the RI</a:t>
+            </a:r>
+          </a:p>
+        </p:txBody>
+      </p:sp>
+      <p:sp>
+        <p:nvSpPr>
+          <p:cNvPr id="3" name="Content Placeholder 2"/>
+          <p:cNvSpPr>
+            <a:spLocks noGrp="1"/>
+          </p:cNvSpPr>
+          <p:nvPr>
+            <p:ph idx="1"/>
+          </p:nvPr>
+        </p:nvSpPr>
+        <p:spPr/>
+        <p:txBody>
+          <a:bodyPr>
+            <a:normAutofit/>
+          </a:bodyPr>
+          <a:lstStyle/>
+          <a:p>
+            <a:r>
+              <a:rPr lang="en-US" dirty="0"/>
+              <a:t>Above rep type in implementation you write:</a:t>
+            </a:r>
+          </a:p>
+          <a:p>
+            <a:pPr marL="457200" lvl="1" indent="0">
+              <a:buNone/>
+            </a:pPr>
+            <a:r>
+              <a:rPr lang="en-US" b="1" dirty="0">
+                <a:latin typeface="Courier"/>
+                <a:cs typeface="Courier"/>
+              </a:rPr>
+              <a:t>(* RI: </a:t>
+            </a:r>
+            <a:r>
+              <a:rPr lang="en-US" b="1" i="1" dirty="0">
+                <a:latin typeface="Courier"/>
+                <a:cs typeface="Courier"/>
+              </a:rPr>
+              <a:t>comment *)</a:t>
+            </a:r>
+          </a:p>
+          <a:p>
+            <a:endParaRPr lang="en-US" dirty="0"/>
+          </a:p>
+          <a:p>
+            <a:r>
+              <a:rPr lang="en-US" dirty="0"/>
+              <a:t>Write it </a:t>
+            </a:r>
+            <a:r>
+              <a:rPr lang="en-US" dirty="0">
+                <a:solidFill>
+                  <a:schemeClr val="accent1"/>
+                </a:solidFill>
+              </a:rPr>
+              <a:t>first</a:t>
+            </a:r>
+            <a:r>
+              <a:rPr lang="en-US" dirty="0"/>
+              <a:t> before implementing operations</a:t>
+            </a:r>
+          </a:p>
+        </p:txBody>
+      </p:sp>
+      <p:sp>
+        <p:nvSpPr>
           <p:cNvPr id="4" name="TextBox 3">
             <a:extLst>
               <a:ext uri="{FF2B5EF4-FFF2-40B4-BE49-F238E27FC236}">
-                <a16:creationId xmlns:a16="http://schemas.microsoft.com/office/drawing/2014/main" id="{A4DC20A2-3E30-B146-9865-597792CEE8C3}"/>
-              </a:ext>
-            </a:extLst>
-          </p:cNvPr>
-          <p:cNvSpPr txBox="1"/>
-          <p:nvPr/>
-        </p:nvSpPr>
-        <p:spPr>
-          <a:xfrm>
-            <a:off x="637309" y="1856507"/>
-            <a:ext cx="7980217" cy="4585871"/>
-          </a:xfrm>
-          <a:prstGeom prst="rect">
-            <a:avLst/>
-          </a:prstGeom>
-          <a:noFill/>
-        </p:spPr>
-        <p:txBody>
-          <a:bodyPr wrap="square" rtlCol="0">
-            <a:spAutoFit/>
-          </a:bodyPr>
-          <a:lstStyle/>
-          <a:p>
-            <a:pPr algn="ctr"/>
-            <a:r>
-              <a:rPr lang="en-US" sz="7200" dirty="0">
-                <a:solidFill>
-                  <a:schemeClr val="accent1"/>
-                </a:solidFill>
-                <a:latin typeface="CronosPro-Regular"/>
-                <a:cs typeface="CronosPro-Regular"/>
-              </a:rPr>
-              <a:t>Rep. invariant</a:t>
-            </a:r>
-          </a:p>
-          <a:p>
-            <a:pPr algn="ctr"/>
-            <a:r>
-              <a:rPr lang="en-US" sz="4400" dirty="0">
-                <a:latin typeface="CronosPro-Regular"/>
-                <a:cs typeface="CronosPro-Regular"/>
-              </a:rPr>
-              <a:t>implicitly part of </a:t>
-            </a:r>
-          </a:p>
-          <a:p>
-            <a:pPr algn="ctr"/>
-            <a:r>
-              <a:rPr lang="en-US" sz="4400" dirty="0">
-                <a:latin typeface="CronosPro-Regular"/>
-                <a:cs typeface="CronosPro-Regular"/>
-              </a:rPr>
-              <a:t>every </a:t>
-            </a:r>
-            <a:r>
-              <a:rPr lang="en-US" sz="4400" dirty="0">
-                <a:solidFill>
-                  <a:schemeClr val="accent3"/>
-                </a:solidFill>
-                <a:latin typeface="CronosPro-Regular"/>
-                <a:cs typeface="CronosPro-Regular"/>
-              </a:rPr>
-              <a:t>precondition</a:t>
-            </a:r>
-            <a:r>
-              <a:rPr lang="en-US" sz="4400" dirty="0">
-                <a:latin typeface="CronosPro-Regular"/>
-                <a:cs typeface="CronosPro-Regular"/>
-              </a:rPr>
-              <a:t> and </a:t>
-            </a:r>
-          </a:p>
-          <a:p>
-            <a:pPr algn="ctr"/>
-            <a:r>
-              <a:rPr lang="en-US" sz="4400" dirty="0">
-                <a:latin typeface="CronosPro-Regular"/>
-                <a:cs typeface="CronosPro-Regular"/>
-              </a:rPr>
-              <a:t>every </a:t>
-            </a:r>
-            <a:r>
-              <a:rPr lang="en-US" sz="4400" dirty="0">
-                <a:solidFill>
-                  <a:schemeClr val="accent3"/>
-                </a:solidFill>
-                <a:latin typeface="CronosPro-Regular"/>
-                <a:cs typeface="CronosPro-Regular"/>
-              </a:rPr>
-              <a:t>postcondition</a:t>
-            </a:r>
-            <a:r>
-              <a:rPr lang="en-US" sz="4400" dirty="0">
-                <a:latin typeface="CronosPro-Regular"/>
-                <a:cs typeface="CronosPro-Regular"/>
-              </a:rPr>
-              <a:t> </a:t>
-            </a:r>
-          </a:p>
-          <a:p>
-            <a:pPr algn="ctr"/>
-            <a:r>
-              <a:rPr lang="en-US" sz="4400" dirty="0">
-                <a:latin typeface="CronosPro-Regular"/>
-                <a:cs typeface="CronosPro-Regular"/>
-              </a:rPr>
-              <a:t>in abstraction</a:t>
-            </a:r>
-            <a:endParaRPr lang="en-US" sz="4400" dirty="0">
-              <a:solidFill>
-                <a:schemeClr val="accent3">
-                  <a:lumMod val="60000"/>
-                  <a:lumOff val="40000"/>
-                </a:schemeClr>
-              </a:solidFill>
-              <a:latin typeface="CronosPro-Regular"/>
-              <a:cs typeface="CronosPro-Regular"/>
-            </a:endParaRPr>
-          </a:p>
-          <a:p>
-            <a:pPr algn="ctr"/>
-            <a:endParaRPr lang="en-US" sz="4400" dirty="0">
-              <a:latin typeface="CronosPro-Regular"/>
-              <a:cs typeface="CronosPro-Regular"/>
-            </a:endParaRPr>
-          </a:p>
-        </p:txBody>
-      </p:sp>
-      <p:sp>
-        <p:nvSpPr>
-          <p:cNvPr id="3" name="TextBox 2">
-            <a:extLst>
-              <a:ext uri="{FF2B5EF4-FFF2-40B4-BE49-F238E27FC236}">
-                <a16:creationId xmlns:a16="http://schemas.microsoft.com/office/drawing/2014/main" id="{7D010D64-6238-EA49-8333-CEEDC5F7D5BC}"/>
+                <a16:creationId xmlns:a16="http://schemas.microsoft.com/office/drawing/2014/main" id="{93862FB4-F75B-8A4A-A1AD-F05025C75983}"/>
               </a:ext>
             </a:extLst>
           </p:cNvPr>
@@ -11080,7 +11144,7 @@
     </p:spTree>
     <p:extLst>
       <p:ext uri="{BB962C8B-B14F-4D97-AF65-F5344CB8AC3E}">
-        <p14:creationId xmlns:p14="http://schemas.microsoft.com/office/powerpoint/2010/main" val="4189804056"/>
+        <p14:creationId xmlns:p14="http://schemas.microsoft.com/office/powerpoint/2010/main" val="514632663"/>
       </p:ext>
     </p:extLst>
   </p:cSld>
@@ -11281,6 +11345,211 @@
 </file>
 
 <file path=ppt/slides/slide30.xml><?xml version="1.0" encoding="utf-8"?>
+<p:sld xmlns:a="http://schemas.openxmlformats.org/drawingml/2006/main" xmlns:r="http://schemas.openxmlformats.org/officeDocument/2006/relationships" xmlns:p="http://schemas.openxmlformats.org/presentationml/2006/main">
+  <p:cSld>
+    <p:spTree>
+      <p:nvGrpSpPr>
+        <p:cNvPr id="1" name=""/>
+        <p:cNvGrpSpPr/>
+        <p:nvPr/>
+      </p:nvGrpSpPr>
+      <p:grpSpPr>
+        <a:xfrm>
+          <a:off x="0" y="0"/>
+          <a:ext cx="0" cy="0"/>
+          <a:chOff x="0" y="0"/>
+          <a:chExt cx="0" cy="0"/>
+        </a:xfrm>
+      </p:grpSpPr>
+      <p:sp>
+        <p:nvSpPr>
+          <p:cNvPr id="4" name="TextBox 3">
+            <a:extLst>
+              <a:ext uri="{FF2B5EF4-FFF2-40B4-BE49-F238E27FC236}">
+                <a16:creationId xmlns:a16="http://schemas.microsoft.com/office/drawing/2014/main" id="{A4DC20A2-3E30-B146-9865-597792CEE8C3}"/>
+              </a:ext>
+            </a:extLst>
+          </p:cNvPr>
+          <p:cNvSpPr txBox="1"/>
+          <p:nvPr/>
+        </p:nvSpPr>
+        <p:spPr>
+          <a:xfrm>
+            <a:off x="637309" y="1856507"/>
+            <a:ext cx="7980217" cy="4585871"/>
+          </a:xfrm>
+          <a:prstGeom prst="rect">
+            <a:avLst/>
+          </a:prstGeom>
+          <a:noFill/>
+        </p:spPr>
+        <p:txBody>
+          <a:bodyPr wrap="square" rtlCol="0">
+            <a:spAutoFit/>
+          </a:bodyPr>
+          <a:lstStyle/>
+          <a:p>
+            <a:pPr algn="ctr"/>
+            <a:r>
+              <a:rPr lang="en-US" sz="7200" dirty="0">
+                <a:solidFill>
+                  <a:schemeClr val="accent1"/>
+                </a:solidFill>
+                <a:latin typeface="CronosPro-Regular"/>
+                <a:cs typeface="CronosPro-Regular"/>
+              </a:rPr>
+              <a:t>Rep. invariant</a:t>
+            </a:r>
+          </a:p>
+          <a:p>
+            <a:pPr algn="ctr"/>
+            <a:r>
+              <a:rPr lang="en-US" sz="4400" dirty="0">
+                <a:latin typeface="CronosPro-Regular"/>
+                <a:cs typeface="CronosPro-Regular"/>
+              </a:rPr>
+              <a:t>implicitly part of </a:t>
+            </a:r>
+          </a:p>
+          <a:p>
+            <a:pPr algn="ctr"/>
+            <a:r>
+              <a:rPr lang="en-US" sz="4400" dirty="0">
+                <a:latin typeface="CronosPro-Regular"/>
+                <a:cs typeface="CronosPro-Regular"/>
+              </a:rPr>
+              <a:t>every </a:t>
+            </a:r>
+            <a:r>
+              <a:rPr lang="en-US" sz="4400" dirty="0">
+                <a:solidFill>
+                  <a:schemeClr val="accent3"/>
+                </a:solidFill>
+                <a:latin typeface="CronosPro-Regular"/>
+                <a:cs typeface="CronosPro-Regular"/>
+              </a:rPr>
+              <a:t>precondition</a:t>
+            </a:r>
+            <a:r>
+              <a:rPr lang="en-US" sz="4400" dirty="0">
+                <a:latin typeface="CronosPro-Regular"/>
+                <a:cs typeface="CronosPro-Regular"/>
+              </a:rPr>
+              <a:t> and </a:t>
+            </a:r>
+          </a:p>
+          <a:p>
+            <a:pPr algn="ctr"/>
+            <a:r>
+              <a:rPr lang="en-US" sz="4400" dirty="0">
+                <a:latin typeface="CronosPro-Regular"/>
+                <a:cs typeface="CronosPro-Regular"/>
+              </a:rPr>
+              <a:t>every </a:t>
+            </a:r>
+            <a:r>
+              <a:rPr lang="en-US" sz="4400" dirty="0">
+                <a:solidFill>
+                  <a:schemeClr val="accent3"/>
+                </a:solidFill>
+                <a:latin typeface="CronosPro-Regular"/>
+                <a:cs typeface="CronosPro-Regular"/>
+              </a:rPr>
+              <a:t>postcondition</a:t>
+            </a:r>
+            <a:r>
+              <a:rPr lang="en-US" sz="4400" dirty="0">
+                <a:latin typeface="CronosPro-Regular"/>
+                <a:cs typeface="CronosPro-Regular"/>
+              </a:rPr>
+              <a:t> </a:t>
+            </a:r>
+          </a:p>
+          <a:p>
+            <a:pPr algn="ctr"/>
+            <a:r>
+              <a:rPr lang="en-US" sz="4400" dirty="0">
+                <a:latin typeface="CronosPro-Regular"/>
+                <a:cs typeface="CronosPro-Regular"/>
+              </a:rPr>
+              <a:t>in abstraction</a:t>
+            </a:r>
+            <a:endParaRPr lang="en-US" sz="4400" dirty="0">
+              <a:solidFill>
+                <a:schemeClr val="accent3">
+                  <a:lumMod val="60000"/>
+                  <a:lumOff val="40000"/>
+                </a:schemeClr>
+              </a:solidFill>
+              <a:latin typeface="CronosPro-Regular"/>
+              <a:cs typeface="CronosPro-Regular"/>
+            </a:endParaRPr>
+          </a:p>
+          <a:p>
+            <a:pPr algn="ctr"/>
+            <a:endParaRPr lang="en-US" sz="4400" dirty="0">
+              <a:latin typeface="CronosPro-Regular"/>
+              <a:cs typeface="CronosPro-Regular"/>
+            </a:endParaRPr>
+          </a:p>
+        </p:txBody>
+      </p:sp>
+      <p:sp>
+        <p:nvSpPr>
+          <p:cNvPr id="3" name="TextBox 2">
+            <a:extLst>
+              <a:ext uri="{FF2B5EF4-FFF2-40B4-BE49-F238E27FC236}">
+                <a16:creationId xmlns:a16="http://schemas.microsoft.com/office/drawing/2014/main" id="{7D010D64-6238-EA49-8333-CEEDC5F7D5BC}"/>
+              </a:ext>
+            </a:extLst>
+          </p:cNvPr>
+          <p:cNvSpPr txBox="1"/>
+          <p:nvPr/>
+        </p:nvSpPr>
+        <p:spPr>
+          <a:xfrm>
+            <a:off x="7820832" y="6094812"/>
+            <a:ext cx="914033" cy="461665"/>
+          </a:xfrm>
+          <a:prstGeom prst="rect">
+            <a:avLst/>
+          </a:prstGeom>
+          <a:noFill/>
+        </p:spPr>
+        <p:txBody>
+          <a:bodyPr wrap="square" rtlCol="0">
+            <a:spAutoFit/>
+          </a:bodyPr>
+          <a:lstStyle/>
+          <a:p>
+            <a:r>
+              <a:rPr lang="en-US" sz="2400" dirty="0">
+                <a:solidFill>
+                  <a:schemeClr val="bg2">
+                    <a:lumMod val="50000"/>
+                  </a:schemeClr>
+                </a:solidFill>
+                <a:latin typeface="Cronos Pro" panose="020C0502030403020304" pitchFamily="34" charset="77"/>
+              </a:rPr>
+              <a:t>Demo</a:t>
+            </a:r>
+          </a:p>
+        </p:txBody>
+      </p:sp>
+    </p:spTree>
+    <p:extLst>
+      <p:ext uri="{BB962C8B-B14F-4D97-AF65-F5344CB8AC3E}">
+        <p14:creationId xmlns:p14="http://schemas.microsoft.com/office/powerpoint/2010/main" val="4189804056"/>
+      </p:ext>
+    </p:extLst>
+  </p:cSld>
+  <p:clrMapOvr>
+    <a:masterClrMapping/>
+  </p:clrMapOvr>
+</p:sld>
+</file>
+
+<file path=ppt/slides/slide31.xml><?xml version="1.0" encoding="utf-8"?>
 <p:sld xmlns:a="http://schemas.openxmlformats.org/drawingml/2006/main" xmlns:r="http://schemas.openxmlformats.org/officeDocument/2006/relationships" xmlns:p="http://schemas.openxmlformats.org/presentationml/2006/main">
   <p:cSld>
     <p:spTree>
@@ -11940,7 +12209,7 @@
 </p:sld>
 </file>
 
-<file path=ppt/slides/slide31.xml><?xml version="1.0" encoding="utf-8"?>
+<file path=ppt/slides/slide32.xml><?xml version="1.0" encoding="utf-8"?>
 <p:sld xmlns:a="http://schemas.openxmlformats.org/drawingml/2006/main" xmlns:r="http://schemas.openxmlformats.org/officeDocument/2006/relationships" xmlns:p="http://schemas.openxmlformats.org/presentationml/2006/main">
   <p:cSld>
     <p:spTree>
@@ -12228,7 +12497,7 @@
 </p:sld>
 </file>
 
-<file path=ppt/slides/slide32.xml><?xml version="1.0" encoding="utf-8"?>
+<file path=ppt/slides/slide33.xml><?xml version="1.0" encoding="utf-8"?>
 <p:sld xmlns:a="http://schemas.openxmlformats.org/drawingml/2006/main" xmlns:r="http://schemas.openxmlformats.org/officeDocument/2006/relationships" xmlns:p="http://schemas.openxmlformats.org/presentationml/2006/main">
   <p:cSld>
     <p:spTree>

</xml_diff>

<commit_message>
Improve a couple slides before lecture
</commit_message>
<xml_diff>
--- a/09-abs-spec/lec.pptx
+++ b/09-abs-spec/lec.pptx
@@ -240,7 +240,7 @@
           <a:p>
             <a:fld id="{5367F125-181F-9A48-A24E-AAD89CB055B5}" type="datetimeFigureOut">
               <a:rPr lang="en-US" smtClean="0"/>
-              <a:t>9/25/19</a:t>
+              <a:t>9/26/19</a:t>
             </a:fld>
             <a:endParaRPr lang="en-US"/>
           </a:p>
@@ -1188,6 +1188,42 @@
           <a:bodyPr/>
           <a:lstStyle/>
           <a:p>
+            <a:pPr lvl="0"/>
+            <a:r>
+              <a:rPr lang="en-US" dirty="0"/>
+              <a:t>Mostly you don’t.</a:t>
+            </a:r>
+          </a:p>
+          <a:p>
+            <a:pPr lvl="0"/>
+            <a:r>
+              <a:rPr lang="en-US" dirty="0"/>
+              <a:t>Abstract values are a mathematical idea not a programming reality</a:t>
+            </a:r>
+          </a:p>
+          <a:p>
+            <a:pPr lvl="0"/>
+            <a:r>
+              <a:rPr lang="en-US" dirty="0"/>
+              <a:t>Would need to have an </a:t>
+            </a:r>
+            <a:r>
+              <a:rPr lang="en-US" dirty="0" err="1"/>
+              <a:t>OCaml</a:t>
+            </a:r>
+            <a:r>
+              <a:rPr lang="en-US" dirty="0"/>
+              <a:t> type for abstract values</a:t>
+            </a:r>
+          </a:p>
+          <a:p>
+            <a:pPr lvl="0"/>
+            <a:r>
+              <a:rPr lang="en-US" dirty="0"/>
+              <a:t>If you had that type, you wouldn’t need whatever data abstraction you’re working on</a:t>
+            </a:r>
+          </a:p>
+          <a:p>
             <a:endParaRPr lang="en-US" dirty="0"/>
           </a:p>
         </p:txBody>
@@ -2968,7 +3004,7 @@
           <a:p>
             <a:fld id="{96331252-4874-F047-84B8-3D3EF8743E79}" type="datetimeFigureOut">
               <a:rPr lang="en-US" smtClean="0"/>
-              <a:t>9/25/19</a:t>
+              <a:t>9/26/19</a:t>
             </a:fld>
             <a:endParaRPr lang="en-US"/>
           </a:p>
@@ -3235,7 +3271,7 @@
           <a:p>
             <a:fld id="{96331252-4874-F047-84B8-3D3EF8743E79}" type="datetimeFigureOut">
               <a:rPr lang="en-US" smtClean="0"/>
-              <a:t>9/25/19</a:t>
+              <a:t>9/26/19</a:t>
             </a:fld>
             <a:endParaRPr lang="en-US"/>
           </a:p>
@@ -3413,7 +3449,7 @@
           <a:p>
             <a:fld id="{96331252-4874-F047-84B8-3D3EF8743E79}" type="datetimeFigureOut">
               <a:rPr lang="en-US" smtClean="0"/>
-              <a:t>9/25/19</a:t>
+              <a:t>9/26/19</a:t>
             </a:fld>
             <a:endParaRPr lang="en-US"/>
           </a:p>
@@ -3589,7 +3625,7 @@
           <a:p>
             <a:fld id="{96331252-4874-F047-84B8-3D3EF8743E79}" type="datetimeFigureOut">
               <a:rPr lang="en-US" smtClean="0"/>
-              <a:t>9/25/19</a:t>
+              <a:t>9/26/19</a:t>
             </a:fld>
             <a:endParaRPr lang="en-US"/>
           </a:p>
@@ -3838,7 +3874,7 @@
           <a:p>
             <a:fld id="{96331252-4874-F047-84B8-3D3EF8743E79}" type="datetimeFigureOut">
               <a:rPr lang="en-US" smtClean="0"/>
-              <a:t>9/25/19</a:t>
+              <a:t>9/26/19</a:t>
             </a:fld>
             <a:endParaRPr lang="en-US"/>
           </a:p>
@@ -4123,7 +4159,7 @@
           <a:p>
             <a:fld id="{96331252-4874-F047-84B8-3D3EF8743E79}" type="datetimeFigureOut">
               <a:rPr lang="en-US" smtClean="0"/>
-              <a:t>9/25/19</a:t>
+              <a:t>9/26/19</a:t>
             </a:fld>
             <a:endParaRPr lang="en-US"/>
           </a:p>
@@ -4542,7 +4578,7 @@
           <a:p>
             <a:fld id="{96331252-4874-F047-84B8-3D3EF8743E79}" type="datetimeFigureOut">
               <a:rPr lang="en-US" smtClean="0"/>
-              <a:t>9/25/19</a:t>
+              <a:t>9/26/19</a:t>
             </a:fld>
             <a:endParaRPr lang="en-US"/>
           </a:p>
@@ -4659,7 +4695,7 @@
           <a:p>
             <a:fld id="{96331252-4874-F047-84B8-3D3EF8743E79}" type="datetimeFigureOut">
               <a:rPr lang="en-US" smtClean="0"/>
-              <a:t>9/25/19</a:t>
+              <a:t>9/26/19</a:t>
             </a:fld>
             <a:endParaRPr lang="en-US"/>
           </a:p>
@@ -4754,7 +4790,7 @@
           <a:p>
             <a:fld id="{96331252-4874-F047-84B8-3D3EF8743E79}" type="datetimeFigureOut">
               <a:rPr lang="en-US" smtClean="0"/>
-              <a:t>9/25/19</a:t>
+              <a:t>9/26/19</a:t>
             </a:fld>
             <a:endParaRPr lang="en-US"/>
           </a:p>
@@ -5029,7 +5065,7 @@
           <a:p>
             <a:fld id="{96331252-4874-F047-84B8-3D3EF8743E79}" type="datetimeFigureOut">
               <a:rPr lang="en-US" smtClean="0"/>
-              <a:t>9/25/19</a:t>
+              <a:t>9/26/19</a:t>
             </a:fld>
             <a:endParaRPr lang="en-US"/>
           </a:p>
@@ -5281,7 +5317,7 @@
           <a:p>
             <a:fld id="{96331252-4874-F047-84B8-3D3EF8743E79}" type="datetimeFigureOut">
               <a:rPr lang="en-US" smtClean="0"/>
-              <a:t>9/25/19</a:t>
+              <a:t>9/26/19</a:t>
             </a:fld>
             <a:endParaRPr lang="en-US"/>
           </a:p>
@@ -5495,7 +5531,7 @@
             <a:fld id="{96331252-4874-F047-84B8-3D3EF8743E79}" type="datetimeFigureOut">
               <a:rPr lang="en-US" smtClean="0"/>
               <a:pPr/>
-              <a:t>9/25/19</a:t>
+              <a:t>9/26/19</a:t>
             </a:fld>
             <a:endParaRPr lang="en-US"/>
           </a:p>
@@ -8775,43 +8811,30 @@
           <a:lstStyle/>
           <a:p>
             <a:r>
+              <a:rPr lang="en-US" dirty="0" err="1">
+                <a:latin typeface="Courier" pitchFamily="2" charset="0"/>
+              </a:rPr>
+              <a:t>to_string</a:t>
+            </a:r>
+            <a:endParaRPr lang="en-US" dirty="0">
+              <a:latin typeface="Courier" pitchFamily="2" charset="0"/>
+            </a:endParaRPr>
+          </a:p>
+          <a:p>
+            <a:r>
+              <a:rPr lang="en-US" dirty="0">
+                <a:latin typeface="Courier" pitchFamily="2" charset="0"/>
+              </a:rPr>
+              <a:t>format</a:t>
+            </a:r>
+            <a:br>
+              <a:rPr lang="en-US" dirty="0">
+                <a:latin typeface="Courier" pitchFamily="2" charset="0"/>
+              </a:rPr>
+            </a:br>
+            <a:r>
               <a:rPr lang="en-US" dirty="0"/>
-              <a:t>You don’t</a:t>
-            </a:r>
-          </a:p>
-          <a:p>
-            <a:pPr lvl="1"/>
-            <a:r>
-              <a:rPr lang="en-US" dirty="0"/>
-              <a:t>Abstract values are a mathematical idea not a programming reality</a:t>
-            </a:r>
-          </a:p>
-          <a:p>
-            <a:pPr lvl="1"/>
-            <a:r>
-              <a:rPr lang="en-US" dirty="0"/>
-              <a:t>Would need to have an </a:t>
-            </a:r>
-            <a:r>
-              <a:rPr lang="en-US" dirty="0" err="1"/>
-              <a:t>OCaml</a:t>
-            </a:r>
-            <a:r>
-              <a:rPr lang="en-US" dirty="0"/>
-              <a:t> type for abstract values</a:t>
-            </a:r>
-          </a:p>
-          <a:p>
-            <a:pPr lvl="1"/>
-            <a:r>
-              <a:rPr lang="en-US" dirty="0"/>
-              <a:t>If you had that type, you wouldn’t need whatever data abstraction you’re working on</a:t>
-            </a:r>
-          </a:p>
-          <a:p>
-            <a:r>
-              <a:rPr lang="en-US" dirty="0"/>
-              <a:t>But conversion to strings comes close</a:t>
+              <a:t>(see abstract types section in textbook)</a:t>
             </a:r>
           </a:p>
         </p:txBody>
@@ -12706,7 +12729,7 @@
         <p:spPr/>
         <p:txBody>
           <a:bodyPr>
-            <a:normAutofit/>
+            <a:normAutofit fontScale="92500"/>
           </a:bodyPr>
           <a:lstStyle/>
           <a:p>
@@ -12743,7 +12766,25 @@
           <a:p>
             <a:r>
               <a:rPr lang="en-US" dirty="0"/>
-              <a:t>Abstract and specification</a:t>
+              <a:t>Abstraction and specification</a:t>
+            </a:r>
+          </a:p>
+          <a:p>
+            <a:r>
+              <a:rPr lang="en-US" dirty="0"/>
+              <a:t>Specifying functions</a:t>
+            </a:r>
+          </a:p>
+          <a:p>
+            <a:r>
+              <a:rPr lang="en-US" dirty="0"/>
+              <a:t>Specifying data abstractions</a:t>
+            </a:r>
+          </a:p>
+          <a:p>
+            <a:r>
+              <a:rPr lang="en-US" dirty="0"/>
+              <a:t>Abstraction functions and representation invariants</a:t>
             </a:r>
           </a:p>
           <a:p>

</xml_diff>

<commit_message>
Add more notes on demo
</commit_message>
<xml_diff>
--- a/09-abs-spec/lec.pptx
+++ b/09-abs-spec/lec.pptx
@@ -772,7 +772,86 @@
             </a:r>
             <a:r>
               <a:rPr lang="en-US" dirty="0"/>
-              <a:t>:  with or without duplicates:  write that down as comment above type [t], and how to interpret the list as a set</a:t>
+              <a:t>:  get students to discover this</a:t>
+            </a:r>
+          </a:p>
+          <a:p>
+            <a:pPr marL="628650" marR="0" lvl="1" indent="-171450" algn="l" defTabSz="457200" rtl="0" eaLnBrk="1" fontAlgn="auto" latinLnBrk="0" hangingPunct="1">
+              <a:lnSpc>
+                <a:spcPct val="100000"/>
+              </a:lnSpc>
+              <a:spcBef>
+                <a:spcPts val="0"/>
+              </a:spcBef>
+              <a:spcAft>
+                <a:spcPts val="0"/>
+              </a:spcAft>
+              <a:buClrTx/>
+              <a:buSzTx/>
+              <a:buFont typeface="Arial" panose="020B0604020202020204" pitchFamily="34" charset="0"/>
+              <a:buChar char="•"/>
+              <a:tabLst/>
+              <a:defRPr/>
+            </a:pPr>
+            <a:r>
+              <a:rPr lang="en-US" dirty="0"/>
+              <a:t>start by implementing empty and mem: empty=[], mem = </a:t>
+            </a:r>
+            <a:r>
+              <a:rPr lang="en-US" dirty="0" err="1"/>
+              <a:t>List.mem</a:t>
+            </a:r>
+            <a:endParaRPr lang="en-US" dirty="0"/>
+          </a:p>
+          <a:p>
+            <a:pPr marL="628650" marR="0" lvl="1" indent="-171450" algn="l" defTabSz="457200" rtl="0" eaLnBrk="1" fontAlgn="auto" latinLnBrk="0" hangingPunct="1">
+              <a:lnSpc>
+                <a:spcPct val="100000"/>
+              </a:lnSpc>
+              <a:spcBef>
+                <a:spcPts val="0"/>
+              </a:spcBef>
+              <a:spcAft>
+                <a:spcPts val="0"/>
+              </a:spcAft>
+              <a:buClrTx/>
+              <a:buSzTx/>
+              <a:buFont typeface="Arial" panose="020B0604020202020204" pitchFamily="34" charset="0"/>
+              <a:buChar char="•"/>
+              <a:tabLst/>
+              <a:defRPr/>
+            </a:pPr>
+            <a:r>
+              <a:rPr lang="en-US" dirty="0"/>
+              <a:t>now implement size as </a:t>
+            </a:r>
+            <a:r>
+              <a:rPr lang="en-US" dirty="0" err="1"/>
+              <a:t>List.length</a:t>
+            </a:r>
+            <a:endParaRPr lang="en-US" dirty="0"/>
+          </a:p>
+          <a:p>
+            <a:pPr marL="628650" marR="0" lvl="1" indent="-171450" algn="l" defTabSz="457200" rtl="0" eaLnBrk="1" fontAlgn="auto" latinLnBrk="0" hangingPunct="1">
+              <a:lnSpc>
+                <a:spcPct val="100000"/>
+              </a:lnSpc>
+              <a:spcBef>
+                <a:spcPts val="0"/>
+              </a:spcBef>
+              <a:spcAft>
+                <a:spcPts val="0"/>
+              </a:spcAft>
+              <a:buClrTx/>
+              <a:buSzTx/>
+              <a:buFont typeface="Arial" panose="020B0604020202020204" pitchFamily="34" charset="0"/>
+              <a:buChar char="•"/>
+              <a:tabLst/>
+              <a:defRPr/>
+            </a:pPr>
+            <a:r>
+              <a:rPr lang="en-US" dirty="0"/>
+              <a:t>now try to implement add.  Discover need for managing duplicates.</a:t>
             </a:r>
           </a:p>
           <a:p>
@@ -782,13 +861,8 @@
             </a:pPr>
             <a:r>
               <a:rPr lang="en-US" dirty="0"/>
-              <a:t>empty=[], mem = </a:t>
-            </a:r>
-            <a:r>
-              <a:rPr lang="en-US" dirty="0" err="1"/>
-              <a:t>List.mem</a:t>
-            </a:r>
-            <a:endParaRPr lang="en-US" dirty="0"/>
+              <a:t>with or without duplicates:  write that down as comment above type [t], and how to interpret the list as a set</a:t>
+            </a:r>
           </a:p>
           <a:p>
             <a:pPr marL="628650" lvl="1" indent="-171450">
@@ -822,6 +896,29 @@
               <a:rPr lang="en-US" dirty="0"/>
               <a:t>with dups:  add is just [::], size requires more work</a:t>
             </a:r>
+          </a:p>
+          <a:p>
+            <a:pPr marL="171450" lvl="0" indent="-171450">
+              <a:buFont typeface="Arial" panose="020B0604020202020204" pitchFamily="34" charset="0"/>
+              <a:buChar char="•"/>
+            </a:pPr>
+            <a:r>
+              <a:rPr lang="en-US" dirty="0"/>
+              <a:t>don’t add union yet; wait </a:t>
+            </a:r>
+            <a:r>
+              <a:rPr lang="en-US" dirty="0" err="1"/>
+              <a:t>til</a:t>
+            </a:r>
+            <a:r>
+              <a:rPr lang="en-US" dirty="0"/>
+              <a:t> </a:t>
+            </a:r>
+            <a:r>
+              <a:rPr lang="en-US"/>
+              <a:t>after clicker question</a:t>
+            </a:r>
+            <a:endParaRPr lang="en-US" dirty="0"/>
           </a:p>
         </p:txBody>
       </p:sp>

</xml_diff>